<commit_message>
08-permissions-orgs added instructor notes to first slide
</commit_message>
<xml_diff>
--- a/08-permissions-orgs.pptx
+++ b/08-permissions-orgs.pptx
@@ -302,7 +302,7 @@
               <a:pPr>
                 <a:defRPr/>
               </a:pPr>
-              <a:t>2016-01-26</a:t>
+              <a:t>2016-01-27</a:t>
             </a:fld>
             <a:endParaRPr lang="en-US" dirty="0"/>
           </a:p>
@@ -485,7 +485,7 @@
               <a:pPr>
                 <a:defRPr/>
               </a:pPr>
-              <a:t>2016-01-26</a:t>
+              <a:t>2016-01-27</a:t>
             </a:fld>
             <a:endParaRPr lang="en-US" dirty="0"/>
           </a:p>
@@ -930,6 +930,93 @@
           <a:bodyPr/>
           <a:lstStyle/>
           <a:p>
+            <a:r>
+              <a:rPr lang="en-US" dirty="0" smtClean="0"/>
+              <a:t>Instructor Note: While managing</a:t>
+            </a:r>
+            <a:r>
+              <a:rPr lang="en-US" baseline="0" dirty="0" smtClean="0"/>
+              <a:t> users and organizations via a web UI may seem like a trivial topic, in Chef Compliance there is some complexity in how nodes are shared via Organizations. So this hands-on module allows the students to manage users, organizations, and teams so they can see the resulting behavior first hand.</a:t>
+            </a:r>
+          </a:p>
+          <a:p>
+            <a:endParaRPr lang="en-US" baseline="0" dirty="0" smtClean="0"/>
+          </a:p>
+          <a:p>
+            <a:r>
+              <a:rPr lang="en-US" dirty="0" smtClean="0"/>
+              <a:t>Instructor Note: LDAP integration is</a:t>
+            </a:r>
+            <a:r>
+              <a:rPr lang="en-US" baseline="0" dirty="0" smtClean="0"/>
+              <a:t> scheduled for Q2 2016. As of this writing</a:t>
+            </a:r>
+            <a:r>
+              <a:rPr lang="en-US" sz="1200" b="0" i="0" kern="1200" dirty="0" smtClean="0">
+                <a:solidFill>
+                  <a:schemeClr val="tx1"/>
+                </a:solidFill>
+                <a:effectLst/>
+                <a:latin typeface="Arial" panose="020B0604020202020204" pitchFamily="34" charset="0"/>
+                <a:ea typeface="ＭＳ Ｐゴシック" charset="0"/>
+                <a:cs typeface="Arial" panose="020B0604020202020204" pitchFamily="34" charset="0"/>
+              </a:rPr>
+              <a:t>, </a:t>
+            </a:r>
+            <a:r>
+              <a:rPr lang="en-US" sz="1200" b="0" i="0" kern="1200" dirty="0" smtClean="0">
+                <a:solidFill>
+                  <a:schemeClr val="tx1"/>
+                </a:solidFill>
+                <a:effectLst/>
+                <a:latin typeface="Arial" panose="020B0604020202020204" pitchFamily="34" charset="0"/>
+                <a:ea typeface="ＭＳ Ｐゴシック" charset="0"/>
+                <a:cs typeface="Arial" panose="020B0604020202020204" pitchFamily="34" charset="0"/>
+              </a:rPr>
+              <a:t>users have two </a:t>
+            </a:r>
+            <a:r>
+              <a:rPr lang="en-US" sz="1200" b="0" i="0" kern="1200" dirty="0" smtClean="0">
+                <a:solidFill>
+                  <a:schemeClr val="tx1"/>
+                </a:solidFill>
+                <a:effectLst/>
+                <a:latin typeface="Arial" panose="020B0604020202020204" pitchFamily="34" charset="0"/>
+                <a:ea typeface="ＭＳ Ｐゴシック" charset="0"/>
+                <a:cs typeface="Arial" panose="020B0604020202020204" pitchFamily="34" charset="0"/>
+              </a:rPr>
+              <a:t>options</a:t>
+            </a:r>
+            <a:r>
+              <a:rPr lang="en-US" sz="1200" b="0" i="0" kern="1200" baseline="0" dirty="0" smtClean="0">
+                <a:solidFill>
+                  <a:schemeClr val="tx1"/>
+                </a:solidFill>
+                <a:effectLst/>
+                <a:latin typeface="Arial" panose="020B0604020202020204" pitchFamily="34" charset="0"/>
+                <a:ea typeface="ＭＳ Ｐゴシック" charset="0"/>
+                <a:cs typeface="Arial" panose="020B0604020202020204" pitchFamily="34" charset="0"/>
+              </a:rPr>
+              <a:t> for managing </a:t>
+            </a:r>
+            <a:r>
+              <a:rPr lang="en-US" baseline="0" dirty="0" smtClean="0"/>
+              <a:t>manage users, organizations, and teams--The web UI or via </a:t>
+            </a:r>
+            <a:r>
+              <a:rPr lang="en-US" baseline="0" smtClean="0"/>
+              <a:t>API: </a:t>
+            </a:r>
+            <a:r>
+              <a:rPr lang="en-US" smtClean="0"/>
+              <a:t>https</a:t>
+            </a:r>
+            <a:r>
+              <a:rPr lang="en-US" dirty="0" smtClean="0"/>
+              <a:t>://docs.chef.io/release/compliance_1-0/api_compliance.html#users</a:t>
+            </a:r>
+          </a:p>
+          <a:p>
             <a:endParaRPr lang="en-US" dirty="0"/>
           </a:p>
         </p:txBody>
@@ -957,7 +1044,7 @@
               <a:pPr>
                 <a:defRPr/>
               </a:pPr>
-              <a:t>2</a:t>
+              <a:t>1</a:t>
             </a:fld>
             <a:endParaRPr lang="en-US" dirty="0"/>
           </a:p>
@@ -1010,7 +1097,7 @@
     </p:spTree>
     <p:extLst>
       <p:ext uri="{BB962C8B-B14F-4D97-AF65-F5344CB8AC3E}">
-        <p14:creationId xmlns:p14="http://schemas.microsoft.com/office/powerpoint/2010/main" val="2407138045"/>
+        <p14:creationId xmlns:p14="http://schemas.microsoft.com/office/powerpoint/2010/main" val="2853119605"/>
       </p:ext>
     </p:extLst>
   </p:cSld>
@@ -1064,6 +1151,14 @@
           <a:bodyPr/>
           <a:lstStyle/>
           <a:p>
+            <a:r>
+              <a:rPr lang="en-US" dirty="0" smtClean="0"/>
+              <a:t>Instructor Note: Answer--The</a:t>
+            </a:r>
+            <a:r>
+              <a:rPr lang="en-US" baseline="0" dirty="0" smtClean="0"/>
+              <a:t> nodes have not gone anywhere. They are only accessible under the admin user's default organization, not under this new `chef` organization. In the next steps we'll add a node to our new organization.</a:t>
+            </a:r>
             <a:endParaRPr lang="en-US" dirty="0"/>
           </a:p>
         </p:txBody>
@@ -1091,7 +1186,7 @@
               <a:pPr>
                 <a:defRPr/>
               </a:pPr>
-              <a:t>17</a:t>
+              <a:t>16</a:t>
             </a:fld>
             <a:endParaRPr lang="en-US" dirty="0"/>
           </a:p>
@@ -1144,7 +1239,7 @@
     </p:spTree>
     <p:extLst>
       <p:ext uri="{BB962C8B-B14F-4D97-AF65-F5344CB8AC3E}">
-        <p14:creationId xmlns:p14="http://schemas.microsoft.com/office/powerpoint/2010/main" val="3125568326"/>
+        <p14:creationId xmlns:p14="http://schemas.microsoft.com/office/powerpoint/2010/main" val="3101897495"/>
       </p:ext>
     </p:extLst>
   </p:cSld>
@@ -1225,7 +1320,7 @@
               <a:pPr>
                 <a:defRPr/>
               </a:pPr>
-              <a:t>18</a:t>
+              <a:t>17</a:t>
             </a:fld>
             <a:endParaRPr lang="en-US" dirty="0"/>
           </a:p>
@@ -1278,7 +1373,7 @@
     </p:spTree>
     <p:extLst>
       <p:ext uri="{BB962C8B-B14F-4D97-AF65-F5344CB8AC3E}">
-        <p14:creationId xmlns:p14="http://schemas.microsoft.com/office/powerpoint/2010/main" val="2503782277"/>
+        <p14:creationId xmlns:p14="http://schemas.microsoft.com/office/powerpoint/2010/main" val="3125568326"/>
       </p:ext>
     </p:extLst>
   </p:cSld>
@@ -1359,7 +1454,7 @@
               <a:pPr>
                 <a:defRPr/>
               </a:pPr>
-              <a:t>19</a:t>
+              <a:t>18</a:t>
             </a:fld>
             <a:endParaRPr lang="en-US" dirty="0"/>
           </a:p>
@@ -1412,7 +1507,7 @@
     </p:spTree>
     <p:extLst>
       <p:ext uri="{BB962C8B-B14F-4D97-AF65-F5344CB8AC3E}">
-        <p14:creationId xmlns:p14="http://schemas.microsoft.com/office/powerpoint/2010/main" val="2641013521"/>
+        <p14:creationId xmlns:p14="http://schemas.microsoft.com/office/powerpoint/2010/main" val="2503782277"/>
       </p:ext>
     </p:extLst>
   </p:cSld>
@@ -1466,10 +1561,6 @@
           <a:bodyPr/>
           <a:lstStyle/>
           <a:p>
-            <a:r>
-              <a:rPr lang="en-US" dirty="0" smtClean="0"/>
-              <a:t>Instructor Note: Answer--Because your new user name is part of the Team object that is resides under the new (chef) organization.</a:t>
-            </a:r>
             <a:endParaRPr lang="en-US" dirty="0"/>
           </a:p>
         </p:txBody>
@@ -1497,7 +1588,7 @@
               <a:pPr>
                 <a:defRPr/>
               </a:pPr>
-              <a:t>20</a:t>
+              <a:t>19</a:t>
             </a:fld>
             <a:endParaRPr lang="en-US" dirty="0"/>
           </a:p>
@@ -1550,7 +1641,7 @@
     </p:spTree>
     <p:extLst>
       <p:ext uri="{BB962C8B-B14F-4D97-AF65-F5344CB8AC3E}">
-        <p14:creationId xmlns:p14="http://schemas.microsoft.com/office/powerpoint/2010/main" val="104711200"/>
+        <p14:creationId xmlns:p14="http://schemas.microsoft.com/office/powerpoint/2010/main" val="2641013521"/>
       </p:ext>
     </p:extLst>
   </p:cSld>
@@ -1604,6 +1695,10 @@
           <a:bodyPr/>
           <a:lstStyle/>
           <a:p>
+            <a:r>
+              <a:rPr lang="en-US" dirty="0" smtClean="0"/>
+              <a:t>Instructor Note: Answer--Because your new user name is part of the Team object that is resides under the new (chef) organization.</a:t>
+            </a:r>
             <a:endParaRPr lang="en-US" dirty="0"/>
           </a:p>
         </p:txBody>
@@ -1631,7 +1726,7 @@
               <a:pPr>
                 <a:defRPr/>
               </a:pPr>
-              <a:t>21</a:t>
+              <a:t>20</a:t>
             </a:fld>
             <a:endParaRPr lang="en-US" dirty="0"/>
           </a:p>
@@ -1684,7 +1779,7 @@
     </p:spTree>
     <p:extLst>
       <p:ext uri="{BB962C8B-B14F-4D97-AF65-F5344CB8AC3E}">
-        <p14:creationId xmlns:p14="http://schemas.microsoft.com/office/powerpoint/2010/main" val="4014415873"/>
+        <p14:creationId xmlns:p14="http://schemas.microsoft.com/office/powerpoint/2010/main" val="104711200"/>
       </p:ext>
     </p:extLst>
   </p:cSld>
@@ -1738,7 +1833,7 @@
           <a:bodyPr/>
           <a:lstStyle/>
           <a:p>
-            <a:endParaRPr lang="en-US" baseline="0" dirty="0" smtClean="0"/>
+            <a:endParaRPr lang="en-US" dirty="0"/>
           </a:p>
         </p:txBody>
       </p:sp>
@@ -1765,7 +1860,7 @@
               <a:pPr>
                 <a:defRPr/>
               </a:pPr>
-              <a:t>22</a:t>
+              <a:t>21</a:t>
             </a:fld>
             <a:endParaRPr lang="en-US" dirty="0"/>
           </a:p>
@@ -1818,7 +1913,7 @@
     </p:spTree>
     <p:extLst>
       <p:ext uri="{BB962C8B-B14F-4D97-AF65-F5344CB8AC3E}">
-        <p14:creationId xmlns:p14="http://schemas.microsoft.com/office/powerpoint/2010/main" val="2565008402"/>
+        <p14:creationId xmlns:p14="http://schemas.microsoft.com/office/powerpoint/2010/main" val="4014415873"/>
       </p:ext>
     </p:extLst>
   </p:cSld>
@@ -1872,6 +1967,140 @@
           <a:bodyPr/>
           <a:lstStyle/>
           <a:p>
+            <a:endParaRPr lang="en-US" baseline="0" dirty="0" smtClean="0"/>
+          </a:p>
+        </p:txBody>
+      </p:sp>
+      <p:sp>
+        <p:nvSpPr>
+          <p:cNvPr id="4" name="Slide Number Placeholder 3"/>
+          <p:cNvSpPr>
+            <a:spLocks noGrp="1"/>
+          </p:cNvSpPr>
+          <p:nvPr>
+            <p:ph type="sldNum" sz="quarter" idx="10"/>
+          </p:nvPr>
+        </p:nvSpPr>
+        <p:spPr/>
+        <p:txBody>
+          <a:bodyPr/>
+          <a:lstStyle/>
+          <a:p>
+            <a:pPr>
+              <a:defRPr/>
+            </a:pPr>
+            <a:fld id="{DC3734AA-3150-D947-AC52-2F5DF48BFCD5}" type="slidenum">
+              <a:rPr lang="en-US" smtClean="0"/>
+              <a:pPr>
+                <a:defRPr/>
+              </a:pPr>
+              <a:t>22</a:t>
+            </a:fld>
+            <a:endParaRPr lang="en-US" dirty="0"/>
+          </a:p>
+        </p:txBody>
+      </p:sp>
+      <p:sp>
+        <p:nvSpPr>
+          <p:cNvPr id="5" name="Header Placeholder 4"/>
+          <p:cNvSpPr>
+            <a:spLocks noGrp="1"/>
+          </p:cNvSpPr>
+          <p:nvPr>
+            <p:ph type="hdr" sz="quarter" idx="11"/>
+          </p:nvPr>
+        </p:nvSpPr>
+        <p:spPr/>
+        <p:txBody>
+          <a:bodyPr/>
+          <a:lstStyle/>
+          <a:p>
+            <a:pPr>
+              <a:defRPr/>
+            </a:pPr>
+            <a:endParaRPr lang="en-US"/>
+          </a:p>
+        </p:txBody>
+      </p:sp>
+      <p:sp>
+        <p:nvSpPr>
+          <p:cNvPr id="6" name="Footer Placeholder 5"/>
+          <p:cNvSpPr>
+            <a:spLocks noGrp="1"/>
+          </p:cNvSpPr>
+          <p:nvPr>
+            <p:ph type="ftr" sz="quarter" idx="12"/>
+          </p:nvPr>
+        </p:nvSpPr>
+        <p:spPr/>
+        <p:txBody>
+          <a:bodyPr/>
+          <a:lstStyle/>
+          <a:p>
+            <a:pPr>
+              <a:defRPr/>
+            </a:pPr>
+            <a:endParaRPr lang="en-US"/>
+          </a:p>
+        </p:txBody>
+      </p:sp>
+    </p:spTree>
+    <p:extLst>
+      <p:ext uri="{BB962C8B-B14F-4D97-AF65-F5344CB8AC3E}">
+        <p14:creationId xmlns:p14="http://schemas.microsoft.com/office/powerpoint/2010/main" val="2565008402"/>
+      </p:ext>
+    </p:extLst>
+  </p:cSld>
+  <p:clrMapOvr>
+    <a:masterClrMapping/>
+  </p:clrMapOvr>
+</p:notes>
+</file>
+
+<file path=ppt/notesSlides/notesSlide17.xml><?xml version="1.0" encoding="utf-8"?>
+<p:notes xmlns:a="http://schemas.openxmlformats.org/drawingml/2006/main" xmlns:r="http://schemas.openxmlformats.org/officeDocument/2006/relationships" xmlns:p="http://schemas.openxmlformats.org/presentationml/2006/main">
+  <p:cSld>
+    <p:spTree>
+      <p:nvGrpSpPr>
+        <p:cNvPr id="1" name=""/>
+        <p:cNvGrpSpPr/>
+        <p:nvPr/>
+      </p:nvGrpSpPr>
+      <p:grpSpPr>
+        <a:xfrm>
+          <a:off x="0" y="0"/>
+          <a:ext cx="0" cy="0"/>
+          <a:chOff x="0" y="0"/>
+          <a:chExt cx="0" cy="0"/>
+        </a:xfrm>
+      </p:grpSpPr>
+      <p:sp>
+        <p:nvSpPr>
+          <p:cNvPr id="2" name="Slide Image Placeholder 1"/>
+          <p:cNvSpPr>
+            <a:spLocks noGrp="1" noRot="1" noChangeAspect="1"/>
+          </p:cNvSpPr>
+          <p:nvPr>
+            <p:ph type="sldImg"/>
+          </p:nvPr>
+        </p:nvSpPr>
+        <p:spPr/>
+      </p:sp>
+      <p:sp>
+        <p:nvSpPr>
+          <p:cNvPr id="3" name="Notes Placeholder 2"/>
+          <p:cNvSpPr>
+            <a:spLocks noGrp="1"/>
+          </p:cNvSpPr>
+          <p:nvPr>
+            <p:ph type="body" idx="1"/>
+          </p:nvPr>
+        </p:nvSpPr>
+        <p:spPr/>
+        <p:txBody>
+          <a:bodyPr/>
+          <a:lstStyle/>
+          <a:p>
             <a:r>
               <a:rPr lang="en-US" dirty="0" smtClean="0"/>
               <a:t>When you create a new team, all these permissions are enabled (checked)</a:t>
@@ -1970,7 +2199,7 @@
 </p:notes>
 </file>
 
-<file path=ppt/notesSlides/notesSlide17.xml><?xml version="1.0" encoding="utf-8"?>
+<file path=ppt/notesSlides/notesSlide18.xml><?xml version="1.0" encoding="utf-8"?>
 <p:notes xmlns:a="http://schemas.openxmlformats.org/drawingml/2006/main" xmlns:r="http://schemas.openxmlformats.org/officeDocument/2006/relationships" xmlns:p="http://schemas.openxmlformats.org/presentationml/2006/main">
   <p:cSld>
     <p:spTree>
@@ -2183,38 +2412,7 @@
           <a:bodyPr/>
           <a:lstStyle/>
           <a:p>
-            <a:r>
-              <a:rPr lang="en-US" dirty="0" smtClean="0"/>
-              <a:t>Permissions are used </a:t>
-            </a:r>
-            <a:r>
-              <a:rPr lang="en-US" dirty="0" smtClean="0"/>
-              <a:t>to control what users and organizations can do in the context of </a:t>
-            </a:r>
-            <a:r>
-              <a:rPr lang="en-US" dirty="0" smtClean="0"/>
-              <a:t>Chef Compliance</a:t>
-            </a:r>
-            <a:r>
-              <a:rPr lang="en-US" dirty="0" smtClean="0"/>
-              <a:t>. You can effectively enable or disable permissions to scan systems, update packages, or manage various aspects of Chef Compliance including users and </a:t>
-            </a:r>
-            <a:r>
-              <a:rPr lang="en-US" dirty="0" smtClean="0"/>
-              <a:t>organizations.</a:t>
-            </a:r>
-          </a:p>
-          <a:p>
-            <a:endParaRPr lang="en-US" dirty="0" smtClean="0"/>
-          </a:p>
-          <a:p>
-            <a:r>
-              <a:rPr lang="en-US" dirty="0" smtClean="0"/>
-              <a:t> </a:t>
-            </a:r>
-          </a:p>
-          <a:p>
-            <a:endParaRPr lang="en-US" dirty="0" smtClean="0"/>
+            <a:endParaRPr lang="en-US" dirty="0"/>
           </a:p>
         </p:txBody>
       </p:sp>
@@ -2241,7 +2439,7 @@
               <a:pPr>
                 <a:defRPr/>
               </a:pPr>
-              <a:t>3</a:t>
+              <a:t>2</a:t>
             </a:fld>
             <a:endParaRPr lang="en-US" dirty="0"/>
           </a:p>
@@ -2294,7 +2492,7 @@
     </p:spTree>
     <p:extLst>
       <p:ext uri="{BB962C8B-B14F-4D97-AF65-F5344CB8AC3E}">
-        <p14:creationId xmlns:p14="http://schemas.microsoft.com/office/powerpoint/2010/main" val="4020403135"/>
+        <p14:creationId xmlns:p14="http://schemas.microsoft.com/office/powerpoint/2010/main" val="2407138045"/>
       </p:ext>
     </p:extLst>
   </p:cSld>
@@ -2350,21 +2548,8 @@
           <a:p>
             <a:r>
               <a:rPr lang="en-US" dirty="0" smtClean="0"/>
-              <a:t>The Site Management</a:t>
-            </a:r>
-            <a:r>
-              <a:rPr lang="en-US" baseline="0" dirty="0" smtClean="0"/>
-              <a:t> permission can be thought of as Administrator-level permissions. It is like a superset of the </a:t>
-            </a:r>
-            <a:r>
-              <a:rPr lang="en-US" b="0" dirty="0" smtClean="0"/>
-              <a:t>Organization Management and the User Management</a:t>
-            </a:r>
-            <a:r>
-              <a:rPr lang="en-US" b="0" baseline="0" dirty="0" smtClean="0"/>
-              <a:t> permissions.</a:t>
-            </a:r>
-            <a:endParaRPr lang="en-US" b="0" dirty="0" smtClean="0"/>
+              <a:t>Permissions are used to control what users and organizations can do in the context of Chef Compliance. You can effectively enable or disable permissions to scan systems, update packages, or manage various aspects of Chef Compliance including users and organizations.</a:t>
+            </a:r>
           </a:p>
           <a:p>
             <a:endParaRPr lang="en-US" dirty="0" smtClean="0"/>
@@ -2372,13 +2557,11 @@
           <a:p>
             <a:r>
               <a:rPr lang="en-US" dirty="0" smtClean="0"/>
-              <a:t>We will</a:t>
-            </a:r>
-            <a:r>
-              <a:rPr lang="en-US" baseline="0" dirty="0" smtClean="0"/>
-              <a:t> discuss Organizations and their purpose later in this module.</a:t>
-            </a:r>
-            <a:endParaRPr lang="en-US" dirty="0"/>
+              <a:t> </a:t>
+            </a:r>
+          </a:p>
+          <a:p>
+            <a:endParaRPr lang="en-US" dirty="0" smtClean="0"/>
           </a:p>
         </p:txBody>
       </p:sp>
@@ -2405,7 +2588,7 @@
               <a:pPr>
                 <a:defRPr/>
               </a:pPr>
-              <a:t>7</a:t>
+              <a:t>3</a:t>
             </a:fld>
             <a:endParaRPr lang="en-US" dirty="0"/>
           </a:p>
@@ -2458,7 +2641,7 @@
     </p:spTree>
     <p:extLst>
       <p:ext uri="{BB962C8B-B14F-4D97-AF65-F5344CB8AC3E}">
-        <p14:creationId xmlns:p14="http://schemas.microsoft.com/office/powerpoint/2010/main" val="1988989554"/>
+        <p14:creationId xmlns:p14="http://schemas.microsoft.com/office/powerpoint/2010/main" val="4020403135"/>
       </p:ext>
     </p:extLst>
   </p:cSld>
@@ -2514,25 +2697,33 @@
           <a:p>
             <a:r>
               <a:rPr lang="en-US" dirty="0" smtClean="0"/>
-              <a:t>Notice</a:t>
+              <a:t>The Site Management</a:t>
             </a:r>
             <a:r>
               <a:rPr lang="en-US" baseline="0" dirty="0" smtClean="0"/>
-              <a:t> that you can't delete the original admin user, however, since you always need at least an admin user.</a:t>
-            </a:r>
+              <a:t> permission can be thought of as Administrator-level permissions. It is like a superset of the </a:t>
+            </a:r>
+            <a:r>
+              <a:rPr lang="en-US" b="0" dirty="0" smtClean="0"/>
+              <a:t>Organization Management and the User Management</a:t>
+            </a:r>
+            <a:r>
+              <a:rPr lang="en-US" b="0" baseline="0" dirty="0" smtClean="0"/>
+              <a:t> permissions.</a:t>
+            </a:r>
+            <a:endParaRPr lang="en-US" b="0" dirty="0" smtClean="0"/>
+          </a:p>
+          <a:p>
             <a:endParaRPr lang="en-US" dirty="0" smtClean="0"/>
           </a:p>
           <a:p>
-            <a:endParaRPr lang="en-US" dirty="0" smtClean="0"/>
-          </a:p>
-          <a:p>
-            <a:r>
-              <a:rPr lang="en-US" dirty="0" smtClean="0"/>
-              <a:t>We will use this new user in the up coming lab</a:t>
+            <a:r>
+              <a:rPr lang="en-US" dirty="0" smtClean="0"/>
+              <a:t>We will</a:t>
             </a:r>
             <a:r>
               <a:rPr lang="en-US" baseline="0" dirty="0" smtClean="0"/>
-              <a:t> exercises.</a:t>
+              <a:t> discuss Organizations and their purpose later in this module.</a:t>
             </a:r>
             <a:endParaRPr lang="en-US" dirty="0"/>
           </a:p>
@@ -2561,7 +2752,7 @@
               <a:pPr>
                 <a:defRPr/>
               </a:pPr>
-              <a:t>8</a:t>
+              <a:t>7</a:t>
             </a:fld>
             <a:endParaRPr lang="en-US" dirty="0"/>
           </a:p>
@@ -2614,7 +2805,7 @@
     </p:spTree>
     <p:extLst>
       <p:ext uri="{BB962C8B-B14F-4D97-AF65-F5344CB8AC3E}">
-        <p14:creationId xmlns:p14="http://schemas.microsoft.com/office/powerpoint/2010/main" val="797718723"/>
+        <p14:creationId xmlns:p14="http://schemas.microsoft.com/office/powerpoint/2010/main" val="1988989554"/>
       </p:ext>
     </p:extLst>
   </p:cSld>
@@ -2670,41 +2861,27 @@
           <a:p>
             <a:r>
               <a:rPr lang="en-US" dirty="0" smtClean="0"/>
-              <a:t>As of this writing, the</a:t>
+              <a:t>Notice</a:t>
             </a:r>
             <a:r>
               <a:rPr lang="en-US" baseline="0" dirty="0" smtClean="0"/>
-              <a:t> only way to share access to nodes </a:t>
+              <a:t> that you can't delete the original admin user, however, since you always need at least an admin user.</a:t>
+            </a:r>
+            <a:endParaRPr lang="en-US" dirty="0" smtClean="0"/>
+          </a:p>
+          <a:p>
+            <a:endParaRPr lang="en-US" dirty="0" smtClean="0"/>
+          </a:p>
+          <a:p>
+            <a:r>
+              <a:rPr lang="en-US" dirty="0" smtClean="0"/>
+              <a:t>We will use this new user in the up coming lab</a:t>
             </a:r>
             <a:r>
               <a:rPr lang="en-US" baseline="0" dirty="0" smtClean="0"/>
-              <a:t>between different user accounts via </a:t>
-            </a:r>
-            <a:r>
-              <a:rPr lang="en-US" baseline="0" dirty="0" smtClean="0"/>
-              <a:t>a combination of an </a:t>
-            </a:r>
-            <a:r>
-              <a:rPr lang="en-US" baseline="0" dirty="0" smtClean="0"/>
-              <a:t>Organization </a:t>
-            </a:r>
-            <a:r>
-              <a:rPr lang="en-US" baseline="0" dirty="0" smtClean="0"/>
-              <a:t>object and its Team object</a:t>
-            </a:r>
-            <a:r>
-              <a:rPr lang="en-US" baseline="0" dirty="0" smtClean="0"/>
-              <a:t>.</a:t>
-            </a:r>
-          </a:p>
-          <a:p>
-            <a:endParaRPr lang="en-US" baseline="0" dirty="0" smtClean="0"/>
-          </a:p>
-          <a:p>
-            <a:endParaRPr lang="en-US" baseline="0" dirty="0" smtClean="0"/>
-          </a:p>
-          <a:p>
-            <a:endParaRPr lang="en-US" baseline="0" dirty="0" smtClean="0"/>
+              <a:t> exercises.</a:t>
+            </a:r>
+            <a:endParaRPr lang="en-US" dirty="0"/>
           </a:p>
         </p:txBody>
       </p:sp>
@@ -2731,7 +2908,7 @@
               <a:pPr>
                 <a:defRPr/>
               </a:pPr>
-              <a:t>11</a:t>
+              <a:t>8</a:t>
             </a:fld>
             <a:endParaRPr lang="en-US" dirty="0"/>
           </a:p>
@@ -2784,7 +2961,7 @@
     </p:spTree>
     <p:extLst>
       <p:ext uri="{BB962C8B-B14F-4D97-AF65-F5344CB8AC3E}">
-        <p14:creationId xmlns:p14="http://schemas.microsoft.com/office/powerpoint/2010/main" val="1940029684"/>
+        <p14:creationId xmlns:p14="http://schemas.microsoft.com/office/powerpoint/2010/main" val="797718723"/>
       </p:ext>
     </p:extLst>
   </p:cSld>
@@ -2838,7 +3015,23 @@
           <a:bodyPr/>
           <a:lstStyle/>
           <a:p>
-            <a:endParaRPr lang="en-US" dirty="0"/>
+            <a:r>
+              <a:rPr lang="en-US" dirty="0" smtClean="0"/>
+              <a:t>As of this writing, the</a:t>
+            </a:r>
+            <a:r>
+              <a:rPr lang="en-US" baseline="0" dirty="0" smtClean="0"/>
+              <a:t> only way to share access to nodes between different user accounts via a combination of an Organization object and its Team object.</a:t>
+            </a:r>
+          </a:p>
+          <a:p>
+            <a:endParaRPr lang="en-US" baseline="0" dirty="0" smtClean="0"/>
+          </a:p>
+          <a:p>
+            <a:endParaRPr lang="en-US" baseline="0" dirty="0" smtClean="0"/>
+          </a:p>
+          <a:p>
+            <a:endParaRPr lang="en-US" baseline="0" dirty="0" smtClean="0"/>
           </a:p>
         </p:txBody>
       </p:sp>
@@ -2865,7 +3058,7 @@
               <a:pPr>
                 <a:defRPr/>
               </a:pPr>
-              <a:t>13</a:t>
+              <a:t>11</a:t>
             </a:fld>
             <a:endParaRPr lang="en-US" dirty="0"/>
           </a:p>
@@ -2918,7 +3111,7 @@
     </p:spTree>
     <p:extLst>
       <p:ext uri="{BB962C8B-B14F-4D97-AF65-F5344CB8AC3E}">
-        <p14:creationId xmlns:p14="http://schemas.microsoft.com/office/powerpoint/2010/main" val="4148579746"/>
+        <p14:creationId xmlns:p14="http://schemas.microsoft.com/office/powerpoint/2010/main" val="1940029684"/>
       </p:ext>
     </p:extLst>
   </p:cSld>
@@ -2999,7 +3192,7 @@
               <a:pPr>
                 <a:defRPr/>
               </a:pPr>
-              <a:t>14</a:t>
+              <a:t>13</a:t>
             </a:fld>
             <a:endParaRPr lang="en-US" dirty="0"/>
           </a:p>
@@ -3052,7 +3245,7 @@
     </p:spTree>
     <p:extLst>
       <p:ext uri="{BB962C8B-B14F-4D97-AF65-F5344CB8AC3E}">
-        <p14:creationId xmlns:p14="http://schemas.microsoft.com/office/powerpoint/2010/main" val="1441109328"/>
+        <p14:creationId xmlns:p14="http://schemas.microsoft.com/office/powerpoint/2010/main" val="4148579746"/>
       </p:ext>
     </p:extLst>
   </p:cSld>
@@ -3133,7 +3326,7 @@
               <a:pPr>
                 <a:defRPr/>
               </a:pPr>
-              <a:t>15</a:t>
+              <a:t>14</a:t>
             </a:fld>
             <a:endParaRPr lang="en-US" dirty="0"/>
           </a:p>
@@ -3186,7 +3379,7 @@
     </p:spTree>
     <p:extLst>
       <p:ext uri="{BB962C8B-B14F-4D97-AF65-F5344CB8AC3E}">
-        <p14:creationId xmlns:p14="http://schemas.microsoft.com/office/powerpoint/2010/main" val="3031306680"/>
+        <p14:creationId xmlns:p14="http://schemas.microsoft.com/office/powerpoint/2010/main" val="1441109328"/>
       </p:ext>
     </p:extLst>
   </p:cSld>
@@ -3240,14 +3433,6 @@
           <a:bodyPr/>
           <a:lstStyle/>
           <a:p>
-            <a:r>
-              <a:rPr lang="en-US" dirty="0" smtClean="0"/>
-              <a:t>Instructor Note: Answer--The</a:t>
-            </a:r>
-            <a:r>
-              <a:rPr lang="en-US" baseline="0" dirty="0" smtClean="0"/>
-              <a:t> nodes have not gone anywhere. They are only accessible under the admin user's default organization, not under this new `chef` organization. In the next steps we'll add a node to our new organization.</a:t>
-            </a:r>
             <a:endParaRPr lang="en-US" dirty="0"/>
           </a:p>
         </p:txBody>
@@ -3275,7 +3460,7 @@
               <a:pPr>
                 <a:defRPr/>
               </a:pPr>
-              <a:t>16</a:t>
+              <a:t>15</a:t>
             </a:fld>
             <a:endParaRPr lang="en-US" dirty="0"/>
           </a:p>
@@ -3328,7 +3513,7 @@
     </p:spTree>
     <p:extLst>
       <p:ext uri="{BB962C8B-B14F-4D97-AF65-F5344CB8AC3E}">
-        <p14:creationId xmlns:p14="http://schemas.microsoft.com/office/powerpoint/2010/main" val="3101897495"/>
+        <p14:creationId xmlns:p14="http://schemas.microsoft.com/office/powerpoint/2010/main" val="3031306680"/>
       </p:ext>
     </p:extLst>
   </p:cSld>
@@ -11948,13 +12133,8 @@
           <a:p>
             <a:r>
               <a:rPr lang="en-US" dirty="0" smtClean="0"/>
-              <a:t>Notice that you cannot access any </a:t>
-            </a:r>
-            <a:r>
-              <a:rPr lang="en-US" dirty="0" smtClean="0"/>
-              <a:t>nodes that were added previously.</a:t>
-            </a:r>
-            <a:endParaRPr lang="en-US" dirty="0" smtClean="0"/>
+              <a:t>Notice that you cannot access any nodes that were added previously.</a:t>
+            </a:r>
           </a:p>
           <a:p>
             <a:endParaRPr lang="en-US" dirty="0"/>
@@ -11962,13 +12142,8 @@
           <a:p>
             <a:r>
               <a:rPr lang="en-US" dirty="0" smtClean="0"/>
-              <a:t>Also notice that your current permissions don't allow you to manage </a:t>
-            </a:r>
-            <a:r>
-              <a:rPr lang="en-US" dirty="0" smtClean="0"/>
-              <a:t>users or organizations.</a:t>
-            </a:r>
-            <a:endParaRPr lang="en-US" dirty="0" smtClean="0"/>
+              <a:t>Also notice that your current permissions don't allow you to manage users or organizations.</a:t>
+            </a:r>
           </a:p>
           <a:p>
             <a:endParaRPr lang="en-US" dirty="0"/>
@@ -12152,27 +12327,7 @@
           <a:p>
             <a:r>
               <a:rPr lang="en-US" dirty="0" smtClean="0"/>
-              <a:t>Before you add nodes that you may want to share with other users, you should first create at least one Compliance </a:t>
-            </a:r>
-            <a:r>
-              <a:rPr lang="en-US" dirty="0" smtClean="0"/>
-              <a:t>organization </a:t>
-            </a:r>
-            <a:r>
-              <a:rPr lang="en-US" dirty="0" smtClean="0"/>
-              <a:t>and a corresponding Compliance </a:t>
-            </a:r>
-            <a:r>
-              <a:rPr lang="en-US" dirty="0" smtClean="0"/>
-              <a:t>team </a:t>
-            </a:r>
-            <a:r>
-              <a:rPr lang="en-US" dirty="0" smtClean="0"/>
-              <a:t>to which those nodes will be associated</a:t>
-            </a:r>
-            <a:r>
-              <a:rPr lang="en-US" dirty="0" smtClean="0"/>
-              <a:t>.</a:t>
+              <a:t>Before you add nodes that you may want to share with other users, you should first create at least one Compliance organization and a corresponding Compliance team to which those nodes will be associated.</a:t>
             </a:r>
           </a:p>
           <a:p>
@@ -12181,15 +12336,7 @@
           <a:p>
             <a:r>
               <a:rPr lang="en-US" dirty="0" smtClean="0"/>
-              <a:t>In </a:t>
-            </a:r>
-            <a:r>
-              <a:rPr lang="en-US" dirty="0" smtClean="0"/>
-              <a:t>such a scenario, y</a:t>
-            </a:r>
-            <a:r>
-              <a:rPr lang="en-US" dirty="0" smtClean="0"/>
-              <a:t>ou'll need to switch to the new organization and then add nodes while you are working under that organization.</a:t>
+              <a:t>In such a scenario, you'll need to switch to the new organization and then add nodes while you are working under that organization.</a:t>
             </a:r>
           </a:p>
           <a:p>
@@ -12729,11 +12876,7 @@
             </a:r>
             <a:r>
               <a:rPr lang="en-US" dirty="0" smtClean="0"/>
-              <a:t> link to add team member to your new organization</a:t>
-            </a:r>
-            <a:r>
-              <a:rPr lang="en-US" dirty="0" smtClean="0"/>
-              <a:t>.</a:t>
+              <a:t> link to add team member to your new organization.</a:t>
             </a:r>
           </a:p>
           <a:p>
@@ -12743,11 +12886,7 @@
             </a:pPr>
             <a:r>
               <a:rPr lang="en-US" dirty="0" smtClean="0"/>
-              <a:t>Click </a:t>
-            </a:r>
-            <a:r>
-              <a:rPr lang="en-US" dirty="0" smtClean="0"/>
-              <a:t>the </a:t>
+              <a:t>Click the </a:t>
             </a:r>
             <a:r>
               <a:rPr lang="en-US" b="1" dirty="0" smtClean="0"/>
@@ -12755,23 +12894,7 @@
             </a:r>
             <a:r>
               <a:rPr lang="en-US" dirty="0" smtClean="0"/>
-              <a:t>field </a:t>
-            </a:r>
-            <a:r>
-              <a:rPr lang="en-US" dirty="0" smtClean="0"/>
-              <a:t>and then select your new user name to </a:t>
-            </a:r>
-            <a:r>
-              <a:rPr lang="en-US" dirty="0" smtClean="0"/>
-              <a:t>add it to this </a:t>
-            </a:r>
-            <a:r>
-              <a:rPr lang="en-US" dirty="0" smtClean="0"/>
-              <a:t>team</a:t>
-            </a:r>
-            <a:r>
-              <a:rPr lang="en-US" dirty="0" smtClean="0"/>
-              <a:t>.</a:t>
+              <a:t>field and then select your new user name to add it to this team.</a:t>
             </a:r>
           </a:p>
           <a:p>
@@ -13234,11 +13357,7 @@
             </a:r>
             <a:r>
               <a:rPr lang="en-US" dirty="0" smtClean="0"/>
-              <a:t>: </a:t>
-            </a:r>
-            <a:r>
-              <a:rPr lang="en-US" dirty="0" smtClean="0"/>
-              <a:t>Where have your previous nodes gone?</a:t>
+              <a:t>: Where have your previous nodes gone?</a:t>
             </a:r>
           </a:p>
           <a:p>
@@ -13869,15 +13988,7 @@
           <a:p>
             <a:r>
               <a:rPr lang="en-US" dirty="0" smtClean="0"/>
-              <a:t>As you may recall, the last time you tried to view nodes while logged </a:t>
-            </a:r>
-            <a:r>
-              <a:rPr lang="en-US" dirty="0" smtClean="0"/>
-              <a:t>in to </a:t>
-            </a:r>
-            <a:r>
-              <a:rPr lang="en-US" dirty="0" smtClean="0"/>
-              <a:t>the Compliance Dashboard with your new user name, you could not see any nodes.</a:t>
+              <a:t>As you may recall, the last time you tried to view nodes while logged in to the Compliance Dashboard with your new user name, you could not see any nodes.</a:t>
             </a:r>
           </a:p>
           <a:p>
@@ -14264,11 +14375,7 @@
           <a:p>
             <a:r>
               <a:rPr lang="en-US" dirty="0" smtClean="0"/>
-              <a:t>While logged in with your new user name, you should now be able to access the node that was created under your new organization</a:t>
-            </a:r>
-            <a:r>
-              <a:rPr lang="en-US" dirty="0" smtClean="0"/>
-              <a:t>.</a:t>
+              <a:t>While logged in with your new user name, you should now be able to access the node that was created under your new organization.</a:t>
             </a:r>
           </a:p>
           <a:p>
@@ -14281,15 +14388,7 @@
             </a:r>
             <a:r>
               <a:rPr lang="en-US" dirty="0" smtClean="0"/>
-              <a:t>: Do </a:t>
-            </a:r>
-            <a:r>
-              <a:rPr lang="en-US" dirty="0" smtClean="0"/>
-              <a:t>you remember why this is possible</a:t>
-            </a:r>
-            <a:r>
-              <a:rPr lang="en-US" dirty="0" smtClean="0"/>
-              <a:t>?</a:t>
+              <a:t>: Do you remember why this is possible?</a:t>
             </a:r>
           </a:p>
           <a:p>
@@ -14451,15 +14550,7 @@
           <a:p>
             <a:r>
               <a:rPr lang="en-US" dirty="0" smtClean="0"/>
-              <a:t>You should only be able to access the </a:t>
-            </a:r>
-            <a:r>
-              <a:rPr lang="en-US" dirty="0" smtClean="0"/>
-              <a:t>node </a:t>
-            </a:r>
-            <a:r>
-              <a:rPr lang="en-US" dirty="0" smtClean="0"/>
-              <a:t>that was created under your new organization.</a:t>
+              <a:t>You should only be able to access the node that was created under your new organization.</a:t>
             </a:r>
             <a:endParaRPr lang="en-US" dirty="0"/>
           </a:p>
@@ -14605,7 +14696,6 @@
               <a:rPr lang="en-US" dirty="0" smtClean="0"/>
               <a:t>Team permissions are completely separate and independent of user permissions.</a:t>
             </a:r>
-            <a:endParaRPr lang="en-US" dirty="0" smtClean="0"/>
           </a:p>
           <a:p>
             <a:endParaRPr lang="en-US" dirty="0" smtClean="0"/>
@@ -14674,11 +14764,7 @@
           <a:p>
             <a:r>
               <a:rPr lang="en-US" dirty="0" smtClean="0"/>
-              <a:t>GL: Managing </a:t>
-            </a:r>
-            <a:r>
-              <a:rPr lang="en-US" dirty="0" smtClean="0"/>
-              <a:t>Team Permissions</a:t>
+              <a:t>GL: Managing Team Permissions</a:t>
             </a:r>
             <a:endParaRPr lang="en-US" dirty="0"/>
           </a:p>
@@ -14912,11 +14998,7 @@
           <a:p>
             <a:r>
               <a:rPr lang="en-US" dirty="0" smtClean="0"/>
-              <a:t>GL: Managing </a:t>
-            </a:r>
-            <a:r>
-              <a:rPr lang="en-US" dirty="0" smtClean="0"/>
-              <a:t>Team Permissions</a:t>
+              <a:t>GL: Managing Team Permissions</a:t>
             </a:r>
             <a:endParaRPr lang="en-US" dirty="0"/>
           </a:p>
@@ -14956,11 +15038,7 @@
             </a:r>
             <a:r>
               <a:rPr lang="en-US" dirty="0" smtClean="0"/>
-              <a:t>from the menu</a:t>
-            </a:r>
-            <a:r>
-              <a:rPr lang="en-US" dirty="0" smtClean="0"/>
-              <a:t>.</a:t>
+              <a:t>from the menu.</a:t>
             </a:r>
           </a:p>
           <a:p>
@@ -15172,11 +15250,7 @@
           <a:p>
             <a:r>
               <a:rPr lang="en-US" dirty="0" smtClean="0"/>
-              <a:t>GL: Managing </a:t>
-            </a:r>
-            <a:r>
-              <a:rPr lang="en-US" dirty="0" smtClean="0"/>
-              <a:t>Team Permissions</a:t>
+              <a:t>GL: Managing Team Permissions</a:t>
             </a:r>
             <a:endParaRPr lang="en-US" dirty="0"/>
           </a:p>
@@ -15429,15 +15503,7 @@
           <a:p>
             <a:r>
               <a:rPr lang="en-US" dirty="0" smtClean="0"/>
-              <a:t>Discussion: </a:t>
-            </a:r>
-            <a:r>
-              <a:rPr lang="en-US" dirty="0" smtClean="0"/>
-              <a:t>Managing </a:t>
-            </a:r>
-            <a:r>
-              <a:rPr lang="en-US" dirty="0" smtClean="0"/>
-              <a:t>Team Permissions</a:t>
+              <a:t>Discussion: Managing Team Permissions</a:t>
             </a:r>
             <a:endParaRPr lang="en-US" dirty="0"/>
           </a:p>
@@ -15678,15 +15744,7 @@
           <a:p>
             <a:r>
               <a:rPr lang="en-US" dirty="0" smtClean="0"/>
-              <a:t>Discussion: </a:t>
-            </a:r>
-            <a:r>
-              <a:rPr lang="en-US" dirty="0" smtClean="0"/>
-              <a:t>Managing </a:t>
-            </a:r>
-            <a:r>
-              <a:rPr lang="en-US" dirty="0" smtClean="0"/>
-              <a:t>Team Permissions</a:t>
+              <a:t>Discussion: Managing Team Permissions</a:t>
             </a:r>
             <a:endParaRPr lang="en-US" dirty="0"/>
           </a:p>
@@ -16311,11 +16369,7 @@
             </a:pPr>
             <a:r>
               <a:rPr lang="en-US" dirty="0" smtClean="0"/>
-              <a:t>Modify a </a:t>
-            </a:r>
-            <a:r>
-              <a:rPr lang="en-US" dirty="0" smtClean="0"/>
-              <a:t>User's </a:t>
+              <a:t>Modify a User's </a:t>
             </a:r>
             <a:r>
               <a:rPr lang="en-US" dirty="0"/>
@@ -16323,11 +16377,7 @@
             </a:r>
             <a:r>
               <a:rPr lang="en-US" dirty="0" smtClean="0"/>
-              <a:t>ermissions</a:t>
-            </a:r>
-            <a:r>
-              <a:rPr lang="en-US" dirty="0" smtClean="0"/>
-              <a:t>.</a:t>
+              <a:t>ermissions.</a:t>
             </a:r>
             <a:endParaRPr lang="en-US" dirty="0"/>
           </a:p>
@@ -18795,27 +18845,6 @@
 </file>
 
 <file path=customXml/item1.xml><?xml version="1.0" encoding="utf-8"?>
-<p:properties xmlns:p="http://schemas.microsoft.com/office/2006/metadata/properties" xmlns:xsi="http://www.w3.org/2001/XMLSchema-instance" xmlns:pc="http://schemas.microsoft.com/office/infopath/2007/PartnerControls">
-  <documentManagement>
-    <_dlc_DocId xmlns="7bb5d761-a2ea-4873-95f7-7a6658fb3ef0">M4CWTKMW727E-592-73</_dlc_DocId>
-    <_dlc_DocIdUrl xmlns="7bb5d761-a2ea-4873-95f7-7a6658fb3ef0">
-      <Url>https://kms.vci.local/marketing/team/_layouts/DocIdRedir.aspx?ID=M4CWTKMW727E-592-73</Url>
-      <Description>M4CWTKMW727E-592-73</Description>
-    </_dlc_DocIdUrl>
-  </documentManagement>
-</p:properties>
-</file>
-
-<file path=customXml/item2.xml><?xml version="1.0" encoding="utf-8"?>
-<?mso-contentType ?>
-<FormTemplates xmlns="http://schemas.microsoft.com/sharepoint/v3/contenttype/forms">
-  <Display>DocumentLibraryForm</Display>
-  <Edit>DocumentLibraryForm</Edit>
-  <New>DocumentLibraryForm</New>
-</FormTemplates>
-</file>
-
-<file path=customXml/item3.xml><?xml version="1.0" encoding="utf-8"?>
 <?mso-contentType ?>
 <spe:Receivers xmlns:spe="http://schemas.microsoft.com/sharepoint/events">
   <Receiver>
@@ -18861,7 +18890,7 @@
 </spe:Receivers>
 </file>
 
-<file path=customXml/item4.xml><?xml version="1.0" encoding="utf-8"?>
+<file path=customXml/item2.xml><?xml version="1.0" encoding="utf-8"?>
 <ct:contentTypeSchema xmlns:ct="http://schemas.microsoft.com/office/2006/metadata/contentType" xmlns:ma="http://schemas.microsoft.com/office/2006/metadata/properties/metaAttributes" ct:_="" ma:_="" ma:contentTypeName="Document" ma:contentTypeID="0x0101000812F700BE7F874999720E88173FE491" ma:contentTypeVersion="0" ma:contentTypeDescription="Create a new document." ma:contentTypeScope="" ma:versionID="3f79f408e2ca720b7aba6e0e32464d0c">
   <xsd:schema xmlns:xsd="http://www.w3.org/2001/XMLSchema" xmlns:xs="http://www.w3.org/2001/XMLSchema" xmlns:p="http://schemas.microsoft.com/office/2006/metadata/properties" xmlns:ns2="7bb5d761-a2ea-4873-95f7-7a6658fb3ef0" targetNamespace="http://schemas.microsoft.com/office/2006/metadata/properties" ma:root="true" ma:fieldsID="1e062cd38ba31e406bfc4340fbc7f87a" ns2:_="">
     <xsd:import namespace="7bb5d761-a2ea-4873-95f7-7a6658fb3ef0"/>
@@ -19006,7 +19035,54 @@
 </ct:contentTypeSchema>
 </file>
 
+<file path=customXml/item3.xml><?xml version="1.0" encoding="utf-8"?>
+<p:properties xmlns:p="http://schemas.microsoft.com/office/2006/metadata/properties" xmlns:xsi="http://www.w3.org/2001/XMLSchema-instance" xmlns:pc="http://schemas.microsoft.com/office/infopath/2007/PartnerControls">
+  <documentManagement>
+    <_dlc_DocId xmlns="7bb5d761-a2ea-4873-95f7-7a6658fb3ef0">M4CWTKMW727E-592-73</_dlc_DocId>
+    <_dlc_DocIdUrl xmlns="7bb5d761-a2ea-4873-95f7-7a6658fb3ef0">
+      <Url>https://kms.vci.local/marketing/team/_layouts/DocIdRedir.aspx?ID=M4CWTKMW727E-592-73</Url>
+      <Description>M4CWTKMW727E-592-73</Description>
+    </_dlc_DocIdUrl>
+  </documentManagement>
+</p:properties>
+</file>
+
+<file path=customXml/item4.xml><?xml version="1.0" encoding="utf-8"?>
+<?mso-contentType ?>
+<FormTemplates xmlns="http://schemas.microsoft.com/sharepoint/v3/contenttype/forms">
+  <Display>DocumentLibraryForm</Display>
+  <Edit>DocumentLibraryForm</Edit>
+  <New>DocumentLibraryForm</New>
+</FormTemplates>
+</file>
+
 <file path=customXml/itemProps1.xml><?xml version="1.0" encoding="utf-8"?>
+<ds:datastoreItem xmlns:ds="http://schemas.openxmlformats.org/officeDocument/2006/customXml" ds:itemID="{B13EBC30-FE27-4C6A-B723-23FC2188F7DC}">
+  <ds:schemaRefs>
+    <ds:schemaRef ds:uri="http://schemas.microsoft.com/sharepoint/events"/>
+  </ds:schemaRefs>
+</ds:datastoreItem>
+</file>
+
+<file path=customXml/itemProps2.xml><?xml version="1.0" encoding="utf-8"?>
+<ds:datastoreItem xmlns:ds="http://schemas.openxmlformats.org/officeDocument/2006/customXml" ds:itemID="{164479E5-0B02-49AC-B79E-EC1D6164DDD3}">
+  <ds:schemaRefs>
+    <ds:schemaRef ds:uri="http://schemas.microsoft.com/office/2006/metadata/contentType"/>
+    <ds:schemaRef ds:uri="http://schemas.microsoft.com/office/2006/metadata/properties/metaAttributes"/>
+    <ds:schemaRef ds:uri="http://www.w3.org/2001/XMLSchema"/>
+    <ds:schemaRef ds:uri="http://schemas.microsoft.com/office/2006/metadata/properties"/>
+    <ds:schemaRef ds:uri="7bb5d761-a2ea-4873-95f7-7a6658fb3ef0"/>
+    <ds:schemaRef ds:uri="http://schemas.microsoft.com/office/2006/documentManagement/types"/>
+    <ds:schemaRef ds:uri="http://schemas.microsoft.com/office/infopath/2007/PartnerControls"/>
+    <ds:schemaRef ds:uri="http://schemas.openxmlformats.org/package/2006/metadata/core-properties"/>
+    <ds:schemaRef ds:uri="http://purl.org/dc/elements/1.1/"/>
+    <ds:schemaRef ds:uri="http://purl.org/dc/terms/"/>
+    <ds:schemaRef ds:uri="http://schemas.microsoft.com/internal/obd"/>
+  </ds:schemaRefs>
+</ds:datastoreItem>
+</file>
+
+<file path=customXml/itemProps3.xml><?xml version="1.0" encoding="utf-8"?>
 <ds:datastoreItem xmlns:ds="http://schemas.openxmlformats.org/officeDocument/2006/customXml" ds:itemID="{6921749B-AEB7-461B-845F-603CABD25259}">
   <ds:schemaRefs>
     <ds:schemaRef ds:uri="http://schemas.microsoft.com/office/2006/documentManagement/types"/>
@@ -19022,36 +19098,10 @@
 </ds:datastoreItem>
 </file>
 
-<file path=customXml/itemProps2.xml><?xml version="1.0" encoding="utf-8"?>
+<file path=customXml/itemProps4.xml><?xml version="1.0" encoding="utf-8"?>
 <ds:datastoreItem xmlns:ds="http://schemas.openxmlformats.org/officeDocument/2006/customXml" ds:itemID="{5CDEB364-43EC-4510-9881-539C2A3FCE9E}">
   <ds:schemaRefs>
     <ds:schemaRef ds:uri="http://schemas.microsoft.com/sharepoint/v3/contenttype/forms"/>
   </ds:schemaRefs>
 </ds:datastoreItem>
-</file>
-
-<file path=customXml/itemProps3.xml><?xml version="1.0" encoding="utf-8"?>
-<ds:datastoreItem xmlns:ds="http://schemas.openxmlformats.org/officeDocument/2006/customXml" ds:itemID="{B13EBC30-FE27-4C6A-B723-23FC2188F7DC}">
-  <ds:schemaRefs>
-    <ds:schemaRef ds:uri="http://schemas.microsoft.com/sharepoint/events"/>
-  </ds:schemaRefs>
-</ds:datastoreItem>
-</file>
-
-<file path=customXml/itemProps4.xml><?xml version="1.0" encoding="utf-8"?>
-<ds:datastoreItem xmlns:ds="http://schemas.openxmlformats.org/officeDocument/2006/customXml" ds:itemID="{164479E5-0B02-49AC-B79E-EC1D6164DDD3}">
-  <ds:schemaRefs>
-    <ds:schemaRef ds:uri="http://schemas.microsoft.com/office/2006/metadata/contentType"/>
-    <ds:schemaRef ds:uri="http://schemas.microsoft.com/office/2006/metadata/properties/metaAttributes"/>
-    <ds:schemaRef ds:uri="http://www.w3.org/2001/XMLSchema"/>
-    <ds:schemaRef ds:uri="http://schemas.microsoft.com/office/2006/metadata/properties"/>
-    <ds:schemaRef ds:uri="7bb5d761-a2ea-4873-95f7-7a6658fb3ef0"/>
-    <ds:schemaRef ds:uri="http://schemas.microsoft.com/office/2006/documentManagement/types"/>
-    <ds:schemaRef ds:uri="http://schemas.microsoft.com/office/infopath/2007/PartnerControls"/>
-    <ds:schemaRef ds:uri="http://schemas.openxmlformats.org/package/2006/metadata/core-properties"/>
-    <ds:schemaRef ds:uri="http://purl.org/dc/elements/1.1/"/>
-    <ds:schemaRef ds:uri="http://purl.org/dc/terms/"/>
-    <ds:schemaRef ds:uri="http://schemas.microsoft.com/internal/obd"/>
-  </ds:schemaRefs>
-</ds:datastoreItem>
 </file>
</xml_diff>

<commit_message>
Moved Discussion:Creating Users slide ahead to 8-6 Resolved all other TBDs from beta class
</commit_message>
<xml_diff>
--- a/08-permissions-orgs.pptx
+++ b/08-permissions-orgs.pptx
@@ -17,8 +17,8 @@
     <p:sldId id="325" r:id="rId9"/>
     <p:sldId id="333" r:id="rId10"/>
     <p:sldId id="335" r:id="rId11"/>
-    <p:sldId id="336" r:id="rId12"/>
-    <p:sldId id="337" r:id="rId13"/>
+    <p:sldId id="337" r:id="rId12"/>
+    <p:sldId id="336" r:id="rId13"/>
     <p:sldId id="338" r:id="rId14"/>
     <p:sldId id="340" r:id="rId15"/>
     <p:sldId id="341" r:id="rId16"/>
@@ -302,7 +302,7 @@
               <a:pPr>
                 <a:defRPr/>
               </a:pPr>
-              <a:t>2016-02-02</a:t>
+              <a:t>2016-02-10</a:t>
             </a:fld>
             <a:endParaRPr lang="en-US" dirty="0"/>
           </a:p>
@@ -485,7 +485,7 @@
               <a:pPr>
                 <a:defRPr/>
               </a:pPr>
-              <a:t>2016-02-02</a:t>
+              <a:t>2016-02-10</a:t>
             </a:fld>
             <a:endParaRPr lang="en-US" dirty="0"/>
           </a:p>
@@ -977,19 +977,11 @@
             </a:r>
             <a:r>
               <a:rPr lang="en-US" baseline="0" dirty="0" smtClean="0"/>
-              <a:t>manage users, organizations, and teams--The web UI or via </a:t>
-            </a:r>
-            <a:r>
-              <a:rPr lang="en-US" baseline="0" smtClean="0"/>
-              <a:t>API: </a:t>
-            </a:r>
-            <a:r>
-              <a:rPr lang="en-US" smtClean="0"/>
-              <a:t>https</a:t>
-            </a:r>
-            <a:r>
-              <a:rPr lang="en-US" dirty="0" smtClean="0"/>
-              <a:t>://docs.chef.io/release/compliance_1-0/api_compliance.html#users</a:t>
+              <a:t>manage users, organizations, and teams--The web UI or via API: </a:t>
+            </a:r>
+            <a:r>
+              <a:rPr lang="en-US" dirty="0" smtClean="0"/>
+              <a:t>https://docs.chef.io/release/compliance_1-0/api_compliance.html#users</a:t>
             </a:r>
           </a:p>
           <a:p>
@@ -2807,15 +2799,6 @@
           <a:p>
             <a:r>
               <a:rPr lang="en-US" dirty="0" smtClean="0"/>
-              <a:t>TBD Move this discussion before preceding slide?</a:t>
-            </a:r>
-          </a:p>
-          <a:p>
-            <a:endParaRPr lang="en-US" dirty="0" smtClean="0"/>
-          </a:p>
-          <a:p>
-            <a:r>
-              <a:rPr lang="en-US" dirty="0" smtClean="0"/>
               <a:t>The </a:t>
             </a:r>
             <a:r>
@@ -2875,7 +2858,7 @@
               <a:pPr>
                 <a:defRPr/>
               </a:pPr>
-              <a:t>7</a:t>
+              <a:t>6</a:t>
             </a:fld>
             <a:endParaRPr lang="en-US" dirty="0"/>
           </a:p>
@@ -3556,14 +3539,6 @@
           <a:bodyPr/>
           <a:lstStyle/>
           <a:p>
-            <a:r>
-              <a:rPr lang="en-US" dirty="0" err="1" smtClean="0"/>
-              <a:t>tbd</a:t>
-            </a:r>
-            <a:r>
-              <a:rPr lang="en-US" dirty="0" smtClean="0"/>
-              <a:t>- remove test-org?</a:t>
-            </a:r>
             <a:endParaRPr lang="en-US" dirty="0"/>
           </a:p>
         </p:txBody>
@@ -4219,14 +4194,14 @@
           </a:ln>
           <a:extLst>
             <a:ext uri="{909E8E84-426E-40dd-AFC4-6F175D3DCCD1}">
-              <a14:hiddenFill xmlns="" xmlns:a14="http://schemas.microsoft.com/office/drawing/2010/main">
+              <a14:hiddenFill xmlns:a14="http://schemas.microsoft.com/office/drawing/2010/main" xmlns="">
                 <a:solidFill>
                   <a:srgbClr val="FFFFFF"/>
                 </a:solidFill>
               </a14:hiddenFill>
             </a:ext>
             <a:ext uri="{91240B29-F687-4f45-9708-019B960494DF}">
-              <a14:hiddenLine xmlns="" xmlns:a14="http://schemas.microsoft.com/office/drawing/2010/main" w="9525">
+              <a14:hiddenLine xmlns:a14="http://schemas.microsoft.com/office/drawing/2010/main" xmlns="" w="9525">
                 <a:solidFill>
                   <a:srgbClr val="000000"/>
                 </a:solidFill>
@@ -4374,14 +4349,14 @@
           </a:ln>
           <a:extLst>
             <a:ext uri="{909E8E84-426E-40dd-AFC4-6F175D3DCCD1}">
-              <a14:hiddenFill xmlns="" xmlns:a14="http://schemas.microsoft.com/office/drawing/2010/main">
+              <a14:hiddenFill xmlns:a14="http://schemas.microsoft.com/office/drawing/2010/main" xmlns="">
                 <a:solidFill>
                   <a:srgbClr val="FFFFFF"/>
                 </a:solidFill>
               </a14:hiddenFill>
             </a:ext>
             <a:ext uri="{91240B29-F687-4f45-9708-019B960494DF}">
-              <a14:hiddenLine xmlns="" xmlns:a14="http://schemas.microsoft.com/office/drawing/2010/main" w="9525">
+              <a14:hiddenLine xmlns:a14="http://schemas.microsoft.com/office/drawing/2010/main" xmlns="" w="9525">
                 <a:solidFill>
                   <a:srgbClr val="000000"/>
                 </a:solidFill>
@@ -4872,14 +4847,14 @@
           </a:ln>
           <a:extLst>
             <a:ext uri="{909E8E84-426E-40dd-AFC4-6F175D3DCCD1}">
-              <a14:hiddenFill xmlns="" xmlns:a14="http://schemas.microsoft.com/office/drawing/2010/main">
+              <a14:hiddenFill xmlns:a14="http://schemas.microsoft.com/office/drawing/2010/main" xmlns="">
                 <a:solidFill>
                   <a:srgbClr val="FFFFFF"/>
                 </a:solidFill>
               </a14:hiddenFill>
             </a:ext>
             <a:ext uri="{91240B29-F687-4f45-9708-019B960494DF}">
-              <a14:hiddenLine xmlns="" xmlns:a14="http://schemas.microsoft.com/office/drawing/2010/main" w="9525">
+              <a14:hiddenLine xmlns:a14="http://schemas.microsoft.com/office/drawing/2010/main" xmlns="" w="9525">
                 <a:solidFill>
                   <a:srgbClr val="000000"/>
                 </a:solidFill>
@@ -5405,14 +5380,14 @@
           </a:ln>
           <a:extLst>
             <a:ext uri="{909E8E84-426E-40dd-AFC4-6F175D3DCCD1}">
-              <a14:hiddenFill xmlns="" xmlns:a14="http://schemas.microsoft.com/office/drawing/2010/main">
+              <a14:hiddenFill xmlns:a14="http://schemas.microsoft.com/office/drawing/2010/main" xmlns="">
                 <a:solidFill>
                   <a:srgbClr val="FFFFFF"/>
                 </a:solidFill>
               </a14:hiddenFill>
             </a:ext>
             <a:ext uri="{91240B29-F687-4f45-9708-019B960494DF}">
-              <a14:hiddenLine xmlns="" xmlns:a14="http://schemas.microsoft.com/office/drawing/2010/main" w="9525">
+              <a14:hiddenLine xmlns:a14="http://schemas.microsoft.com/office/drawing/2010/main" xmlns="" w="9525">
                 <a:solidFill>
                   <a:srgbClr val="000000"/>
                 </a:solidFill>
@@ -7036,14 +7011,14 @@
           </a:ln>
           <a:extLst>
             <a:ext uri="{909E8E84-426E-40dd-AFC4-6F175D3DCCD1}">
-              <a14:hiddenFill xmlns="" xmlns:a14="http://schemas.microsoft.com/office/drawing/2010/main">
+              <a14:hiddenFill xmlns:a14="http://schemas.microsoft.com/office/drawing/2010/main" xmlns="">
                 <a:solidFill>
                   <a:srgbClr val="FFFFFF"/>
                 </a:solidFill>
               </a14:hiddenFill>
             </a:ext>
             <a:ext uri="{91240B29-F687-4f45-9708-019B960494DF}">
-              <a14:hiddenLine xmlns="" xmlns:a14="http://schemas.microsoft.com/office/drawing/2010/main" w="9525">
+              <a14:hiddenLine xmlns:a14="http://schemas.microsoft.com/office/drawing/2010/main" xmlns="" w="9525">
                 <a:solidFill>
                   <a:srgbClr val="000000"/>
                 </a:solidFill>
@@ -8578,14 +8553,14 @@
           </a:ln>
           <a:extLst>
             <a:ext uri="{909E8E84-426E-40dd-AFC4-6F175D3DCCD1}">
-              <a14:hiddenFill xmlns="" xmlns:a14="http://schemas.microsoft.com/office/drawing/2010/main">
+              <a14:hiddenFill xmlns:a14="http://schemas.microsoft.com/office/drawing/2010/main" xmlns="">
                 <a:solidFill>
                   <a:srgbClr val="FFFFFF"/>
                 </a:solidFill>
               </a14:hiddenFill>
             </a:ext>
             <a:ext uri="{91240B29-F687-4f45-9708-019B960494DF}">
-              <a14:hiddenLine xmlns="" xmlns:a14="http://schemas.microsoft.com/office/drawing/2010/main" w="9525">
+              <a14:hiddenLine xmlns:a14="http://schemas.microsoft.com/office/drawing/2010/main" xmlns="" w="9525">
                 <a:solidFill>
                   <a:srgbClr val="000000"/>
                 </a:solidFill>
@@ -9091,14 +9066,14 @@
           </a:ln>
           <a:extLst>
             <a:ext uri="{909E8E84-426E-40dd-AFC4-6F175D3DCCD1}">
-              <a14:hiddenFill xmlns="" xmlns:a14="http://schemas.microsoft.com/office/drawing/2010/main">
+              <a14:hiddenFill xmlns:a14="http://schemas.microsoft.com/office/drawing/2010/main" xmlns="">
                 <a:solidFill>
                   <a:srgbClr val="FFFFFF"/>
                 </a:solidFill>
               </a14:hiddenFill>
             </a:ext>
             <a:ext uri="{91240B29-F687-4f45-9708-019B960494DF}">
-              <a14:hiddenLine xmlns="" xmlns:a14="http://schemas.microsoft.com/office/drawing/2010/main" w="9525">
+              <a14:hiddenLine xmlns:a14="http://schemas.microsoft.com/office/drawing/2010/main" xmlns="" w="9525">
                 <a:solidFill>
                   <a:srgbClr val="000000"/>
                 </a:solidFill>
@@ -9665,14 +9640,14 @@
           </a:ln>
           <a:extLst>
             <a:ext uri="{909E8E84-426E-40dd-AFC4-6F175D3DCCD1}">
-              <a14:hiddenFill xmlns="" xmlns:a14="http://schemas.microsoft.com/office/drawing/2010/main">
+              <a14:hiddenFill xmlns:a14="http://schemas.microsoft.com/office/drawing/2010/main" xmlns="">
                 <a:solidFill>
                   <a:srgbClr val="FFFFFF"/>
                 </a:solidFill>
               </a14:hiddenFill>
             </a:ext>
             <a:ext uri="{91240B29-F687-4f45-9708-019B960494DF}">
-              <a14:hiddenLine xmlns="" xmlns:a14="http://schemas.microsoft.com/office/drawing/2010/main" w="9525">
+              <a14:hiddenLine xmlns:a14="http://schemas.microsoft.com/office/drawing/2010/main" xmlns="" w="9525">
                 <a:solidFill>
                   <a:srgbClr val="000000"/>
                 </a:solidFill>
@@ -10612,14 +10587,14 @@
           </a:ln>
           <a:extLst>
             <a:ext uri="{909E8E84-426E-40dd-AFC4-6F175D3DCCD1}">
-              <a14:hiddenFill xmlns="" xmlns:a14="http://schemas.microsoft.com/office/drawing/2010/main">
+              <a14:hiddenFill xmlns:a14="http://schemas.microsoft.com/office/drawing/2010/main" xmlns="">
                 <a:solidFill>
                   <a:srgbClr val="FFFFFF"/>
                 </a:solidFill>
               </a14:hiddenFill>
             </a:ext>
             <a:ext uri="{91240B29-F687-4f45-9708-019B960494DF}">
-              <a14:hiddenLine xmlns="" xmlns:a14="http://schemas.microsoft.com/office/drawing/2010/main" w="9525">
+              <a14:hiddenLine xmlns:a14="http://schemas.microsoft.com/office/drawing/2010/main" xmlns="" w="9525">
                 <a:solidFill>
                   <a:srgbClr val="000000"/>
                 </a:solidFill>
@@ -11372,14 +11347,14 @@
           </a:ln>
           <a:extLst>
             <a:ext uri="{909E8E84-426E-40dd-AFC4-6F175D3DCCD1}">
-              <a14:hiddenFill xmlns="" xmlns:a14="http://schemas.microsoft.com/office/drawing/2010/main">
+              <a14:hiddenFill xmlns:a14="http://schemas.microsoft.com/office/drawing/2010/main" xmlns="">
                 <a:solidFill>
                   <a:srgbClr val="FFFFFF"/>
                 </a:solidFill>
               </a14:hiddenFill>
             </a:ext>
             <a:ext uri="{91240B29-F687-4f45-9708-019B960494DF}">
-              <a14:hiddenLine xmlns="" xmlns:a14="http://schemas.microsoft.com/office/drawing/2010/main" w="9525">
+              <a14:hiddenLine xmlns:a14="http://schemas.microsoft.com/office/drawing/2010/main" xmlns="" w="9525">
                 <a:solidFill>
                   <a:srgbClr val="000000"/>
                 </a:solidFill>
@@ -12620,15 +12595,7 @@
             </a:pPr>
             <a:r>
               <a:rPr lang="en-US" dirty="0" smtClean="0"/>
-              <a:t>Test </a:t>
-            </a:r>
-            <a:r>
-              <a:rPr lang="en-US" dirty="0" smtClean="0"/>
-              <a:t>a </a:t>
-            </a:r>
-            <a:r>
-              <a:rPr lang="en-US" dirty="0" smtClean="0"/>
-              <a:t>Team Member's Access to a Node.</a:t>
+              <a:t>Test a Team Member's Access to a Node.</a:t>
             </a:r>
           </a:p>
           <a:p>
@@ -13366,35 +13333,74 @@
           </a:p>
         </p:txBody>
       </p:sp>
-      <p:pic>
-        <p:nvPicPr>
-          <p:cNvPr id="7" name="Picture 6"/>
-          <p:cNvPicPr>
-            <a:picLocks noChangeAspect="1"/>
-          </p:cNvPicPr>
+      <p:grpSp>
+        <p:nvGrpSpPr>
+          <p:cNvPr id="5" name="Group 4"/>
+          <p:cNvGrpSpPr/>
           <p:nvPr/>
-        </p:nvPicPr>
-        <p:blipFill>
-          <a:blip r:embed="rId3"/>
-          <a:stretch>
-            <a:fillRect/>
-          </a:stretch>
-        </p:blipFill>
-        <p:spPr>
+        </p:nvGrpSpPr>
+        <p:grpSpPr>
           <a:xfrm>
             <a:off x="7626500" y="609076"/>
             <a:ext cx="8464293" cy="5597171"/>
+            <a:chOff x="7626500" y="609076"/>
+            <a:chExt cx="8464293" cy="5597171"/>
           </a:xfrm>
-          <a:prstGeom prst="rect">
-            <a:avLst/>
-          </a:prstGeom>
-          <a:ln>
-            <a:solidFill>
-              <a:schemeClr val="accent1"/>
-            </a:solidFill>
-          </a:ln>
-        </p:spPr>
-      </p:pic>
+        </p:grpSpPr>
+        <p:pic>
+          <p:nvPicPr>
+            <p:cNvPr id="7" name="Picture 6"/>
+            <p:cNvPicPr>
+              <a:picLocks noChangeAspect="1"/>
+            </p:cNvPicPr>
+            <p:nvPr/>
+          </p:nvPicPr>
+          <p:blipFill>
+            <a:blip r:embed="rId3"/>
+            <a:stretch>
+              <a:fillRect/>
+            </a:stretch>
+          </p:blipFill>
+          <p:spPr>
+            <a:xfrm>
+              <a:off x="7626500" y="609076"/>
+              <a:ext cx="8464293" cy="5597171"/>
+            </a:xfrm>
+            <a:prstGeom prst="rect">
+              <a:avLst/>
+            </a:prstGeom>
+            <a:ln>
+              <a:solidFill>
+                <a:schemeClr val="accent1"/>
+              </a:solidFill>
+            </a:ln>
+          </p:spPr>
+        </p:pic>
+        <p:pic>
+          <p:nvPicPr>
+            <p:cNvPr id="4" name="Picture 3"/>
+            <p:cNvPicPr>
+              <a:picLocks noChangeAspect="1"/>
+            </p:cNvPicPr>
+            <p:nvPr/>
+          </p:nvPicPr>
+          <p:blipFill>
+            <a:blip r:embed="rId4"/>
+            <a:stretch>
+              <a:fillRect/>
+            </a:stretch>
+          </p:blipFill>
+          <p:spPr>
+            <a:xfrm>
+              <a:off x="8124126" y="3856759"/>
+              <a:ext cx="570612" cy="307253"/>
+            </a:xfrm>
+            <a:prstGeom prst="rect">
+              <a:avLst/>
+            </a:prstGeom>
+          </p:spPr>
+        </p:pic>
+      </p:grpSp>
       <p:cxnSp>
         <p:nvCxnSpPr>
           <p:cNvPr id="13" name="Straight Arrow Connector 12"/>
@@ -15794,11 +15800,7 @@
             </a:r>
             <a:r>
               <a:rPr lang="en-US" dirty="0" smtClean="0"/>
-              <a:t>permissions, when checked, enable the team members to </a:t>
-            </a:r>
-            <a:r>
-              <a:rPr lang="en-US" dirty="0" smtClean="0"/>
-              <a:t>add</a:t>
+              <a:t>permissions, when checked, enable the team members to add</a:t>
             </a:r>
             <a:r>
               <a:rPr lang="en-US" dirty="0"/>
@@ -16550,15 +16552,7 @@
           <a:p>
             <a:r>
               <a:rPr lang="en-US" dirty="0" smtClean="0"/>
-              <a:t>You can also modify their permission </a:t>
-            </a:r>
-            <a:r>
-              <a:rPr lang="en-US" dirty="0" smtClean="0"/>
-              <a:t>to </a:t>
-            </a:r>
-            <a:r>
-              <a:rPr lang="en-US" dirty="0" smtClean="0"/>
-              <a:t>allow or prevent certain actions.</a:t>
+              <a:t>You can also modify their permission to allow or prevent certain actions.</a:t>
             </a:r>
             <a:endParaRPr lang="en-US" dirty="0"/>
           </a:p>
@@ -16988,6 +16982,42 @@
           </a:fontRef>
         </p:style>
       </p:cxnSp>
+      <p:cxnSp>
+        <p:nvCxnSpPr>
+          <p:cNvPr id="13" name="Straight Arrow Connector 12"/>
+          <p:cNvCxnSpPr/>
+          <p:nvPr/>
+        </p:nvCxnSpPr>
+        <p:spPr>
+          <a:xfrm>
+            <a:off x="5373104" y="5203172"/>
+            <a:ext cx="6714818" cy="1161433"/>
+          </a:xfrm>
+          <a:prstGeom prst="straightConnector1">
+            <a:avLst/>
+          </a:prstGeom>
+          <a:ln>
+            <a:solidFill>
+              <a:schemeClr val="accent1"/>
+            </a:solidFill>
+            <a:tailEnd type="triangle"/>
+          </a:ln>
+        </p:spPr>
+        <p:style>
+          <a:lnRef idx="3">
+            <a:schemeClr val="accent1"/>
+          </a:lnRef>
+          <a:fillRef idx="0">
+            <a:schemeClr val="accent1"/>
+          </a:fillRef>
+          <a:effectRef idx="2">
+            <a:schemeClr val="accent1"/>
+          </a:effectRef>
+          <a:fontRef idx="minor">
+            <a:schemeClr val="tx1"/>
+          </a:fontRef>
+        </p:style>
+      </p:cxnSp>
     </p:spTree>
     <p:extLst>
       <p:ext uri="{BB962C8B-B14F-4D97-AF65-F5344CB8AC3E}">
@@ -17040,12 +17070,21 @@
         </p:nvSpPr>
         <p:spPr/>
         <p:txBody>
-          <a:bodyPr/>
+          <a:bodyPr>
+            <a:normAutofit fontScale="90000"/>
+          </a:bodyPr>
           <a:lstStyle/>
           <a:p>
             <a:r>
               <a:rPr lang="en-US" dirty="0" smtClean="0"/>
-              <a:t>GL: Creating Users</a:t>
+              <a:t>Discussion:</a:t>
+            </a:r>
+            <a:br>
+              <a:rPr lang="en-US" dirty="0" smtClean="0"/>
+            </a:br>
+            <a:r>
+              <a:rPr lang="en-US" dirty="0" smtClean="0"/>
+              <a:t>Creating Users</a:t>
             </a:r>
             <a:endParaRPr lang="en-US" dirty="0"/>
           </a:p>
@@ -17064,89 +17103,123 @@
         <p:spPr>
           <a:xfrm>
             <a:off x="650040" y="1856198"/>
-            <a:ext cx="6006792" cy="5345953"/>
+            <a:ext cx="6464438" cy="5897914"/>
           </a:xfrm>
         </p:spPr>
         <p:txBody>
           <a:bodyPr/>
           <a:lstStyle/>
           <a:p>
-            <a:pPr marL="514350" indent="-514350">
-              <a:buFont typeface="+mj-lt"/>
-              <a:buAutoNum type="arabicPeriod" startAt="4"/>
+            <a:r>
+              <a:rPr lang="en-US" dirty="0" smtClean="0"/>
+              <a:t>The Users/Create screen displays.</a:t>
+            </a:r>
+          </a:p>
+          <a:p>
+            <a:r>
+              <a:rPr lang="en-US" dirty="0" smtClean="0"/>
+              <a:t>A </a:t>
+            </a:r>
+            <a:r>
+              <a:rPr lang="en-US" dirty="0"/>
+              <a:t>user can have the following permissions</a:t>
+            </a:r>
+            <a:r>
+              <a:rPr lang="en-US" dirty="0" smtClean="0"/>
+              <a:t>:</a:t>
+            </a:r>
+            <a:endParaRPr lang="en-US" dirty="0" smtClean="0"/>
+          </a:p>
+          <a:p>
+            <a:pPr marL="457200" indent="-457200">
+              <a:buFont typeface="Wingdings" panose="05000000000000000000" pitchFamily="2" charset="2"/>
+              <a:buChar char="q"/>
             </a:pPr>
             <a:r>
-              <a:rPr lang="en-US" dirty="0" smtClean="0"/>
-              <a:t>From the resulting screen, type a </a:t>
+              <a:rPr lang="en-US" b="1" dirty="0"/>
+              <a:t>S</a:t>
             </a:r>
             <a:r>
               <a:rPr lang="en-US" b="1" dirty="0" smtClean="0"/>
-              <a:t>user name </a:t>
-            </a:r>
-            <a:r>
-              <a:rPr lang="en-US" dirty="0" smtClean="0"/>
-              <a:t>of your choice and a password you'll remember, like </a:t>
-            </a:r>
+              <a:t>ite Management </a:t>
+            </a:r>
+            <a:r>
+              <a:rPr lang="en-US" dirty="0" smtClean="0"/>
+              <a:t>users can do everything.</a:t>
+            </a:r>
+          </a:p>
+          <a:p>
+            <a:pPr marL="457200" indent="-457200">
+              <a:buFont typeface="Wingdings" panose="05000000000000000000" pitchFamily="2" charset="2"/>
+              <a:buChar char="q"/>
+            </a:pPr>
             <a:r>
               <a:rPr lang="en-US" b="1" dirty="0" smtClean="0"/>
-              <a:t>chef</a:t>
-            </a:r>
-            <a:r>
-              <a:rPr lang="en-US" dirty="0" smtClean="0"/>
-              <a:t>.</a:t>
-            </a:r>
-          </a:p>
-          <a:p>
-            <a:endParaRPr lang="en-US" dirty="0" smtClean="0"/>
-          </a:p>
-          <a:p>
+              <a:t>Organization Management </a:t>
+            </a:r>
+            <a:r>
+              <a:rPr lang="en-US" dirty="0" smtClean="0"/>
+              <a:t>users can </a:t>
+            </a:r>
+            <a:r>
+              <a:rPr lang="en-US" dirty="0"/>
+              <a:t>create, edit or delete </a:t>
+            </a:r>
+            <a:r>
+              <a:rPr lang="en-US" dirty="0" smtClean="0"/>
+              <a:t>Organizations.</a:t>
+            </a:r>
+          </a:p>
+          <a:p>
+            <a:pPr marL="457200" indent="-457200">
+              <a:buFont typeface="Wingdings" panose="05000000000000000000" pitchFamily="2" charset="2"/>
+              <a:buChar char="q"/>
+            </a:pPr>
             <a:r>
               <a:rPr lang="en-US" b="1" dirty="0" smtClean="0"/>
-              <a:t>Note</a:t>
-            </a:r>
-            <a:r>
-              <a:rPr lang="en-US" dirty="0" smtClean="0"/>
-              <a:t>: Leave the new user's permissions unchecked for now.</a:t>
-            </a:r>
-          </a:p>
-          <a:p>
-            <a:endParaRPr lang="en-US" dirty="0" smtClean="0"/>
-          </a:p>
-          <a:p>
-            <a:r>
-              <a:rPr lang="en-US" dirty="0" smtClean="0"/>
-              <a:t>5. Click the </a:t>
-            </a:r>
-            <a:r>
-              <a:rPr lang="en-US" b="1" dirty="0" smtClean="0"/>
-              <a:t>Add user</a:t>
-            </a:r>
-            <a:r>
-              <a:rPr lang="en-US" dirty="0" smtClean="0"/>
-              <a:t> button.</a:t>
-            </a:r>
+              <a:t>User Management </a:t>
+            </a:r>
+            <a:r>
+              <a:rPr lang="en-US" dirty="0" smtClean="0"/>
+              <a:t>users can </a:t>
+            </a:r>
+            <a:r>
+              <a:rPr lang="en-US" dirty="0"/>
+              <a:t>create, edit or delete </a:t>
+            </a:r>
+            <a:r>
+              <a:rPr lang="en-US" dirty="0" smtClean="0"/>
+              <a:t>users.</a:t>
+            </a:r>
+            <a:r>
+              <a:rPr lang="en-US" dirty="0"/>
+              <a:t/>
+            </a:r>
+            <a:br>
+              <a:rPr lang="en-US" dirty="0"/>
+            </a:br>
             <a:endParaRPr lang="en-US" dirty="0"/>
           </a:p>
         </p:txBody>
       </p:sp>
       <p:pic>
         <p:nvPicPr>
-          <p:cNvPr id="8" name="Picture 7"/>
+          <p:cNvPr id="4" name="Picture 3"/>
           <p:cNvPicPr>
             <a:picLocks noChangeAspect="1"/>
           </p:cNvPicPr>
           <p:nvPr/>
         </p:nvPicPr>
         <p:blipFill>
-          <a:blip r:embed="rId2"/>
+          <a:blip r:embed="rId3"/>
           <a:stretch>
             <a:fillRect/>
           </a:stretch>
         </p:blipFill>
         <p:spPr>
           <a:xfrm>
-            <a:off x="8544060" y="462914"/>
-            <a:ext cx="7000741" cy="7071742"/>
+            <a:off x="8396287" y="447472"/>
+            <a:ext cx="7348702" cy="6746350"/>
           </a:xfrm>
           <a:prstGeom prst="rect">
             <a:avLst/>
@@ -17161,7 +17234,7 @@
     </p:spTree>
     <p:extLst>
       <p:ext uri="{BB962C8B-B14F-4D97-AF65-F5344CB8AC3E}">
-        <p14:creationId xmlns:p14="http://schemas.microsoft.com/office/powerpoint/2010/main" val="3093924348"/>
+        <p14:creationId xmlns:p14="http://schemas.microsoft.com/office/powerpoint/2010/main" val="3254653793"/>
       </p:ext>
     </p:extLst>
   </p:cSld>
@@ -17210,21 +17283,12 @@
         </p:nvSpPr>
         <p:spPr/>
         <p:txBody>
-          <a:bodyPr>
-            <a:normAutofit fontScale="90000"/>
-          </a:bodyPr>
+          <a:bodyPr/>
           <a:lstStyle/>
           <a:p>
             <a:r>
               <a:rPr lang="en-US" dirty="0" smtClean="0"/>
-              <a:t>Discussion:</a:t>
-            </a:r>
-            <a:br>
-              <a:rPr lang="en-US" dirty="0" smtClean="0"/>
-            </a:br>
-            <a:r>
-              <a:rPr lang="en-US" dirty="0" smtClean="0"/>
-              <a:t>Creating Users</a:t>
+              <a:t>GL: Creating Users</a:t>
             </a:r>
             <a:endParaRPr lang="en-US" dirty="0"/>
           </a:p>
@@ -17242,116 +17306,98 @@
         </p:nvSpPr>
         <p:spPr>
           <a:xfrm>
-            <a:off x="650040" y="1856198"/>
-            <a:ext cx="6006792" cy="5897914"/>
+            <a:off x="650039" y="1856198"/>
+            <a:ext cx="6709765" cy="5345953"/>
           </a:xfrm>
         </p:spPr>
         <p:txBody>
           <a:bodyPr/>
           <a:lstStyle/>
           <a:p>
+            <a:pPr marL="514350" indent="-514350">
+              <a:buFont typeface="+mj-lt"/>
+              <a:buAutoNum type="arabicPeriod" startAt="4"/>
+            </a:pPr>
+            <a:r>
+              <a:rPr lang="en-US" dirty="0" smtClean="0"/>
+              <a:t>From the </a:t>
+            </a:r>
             <a:r>
               <a:rPr lang="en-US" dirty="0"/>
-              <a:t>A user can have the following permissions</a:t>
-            </a:r>
-            <a:r>
-              <a:rPr lang="en-US" dirty="0" smtClean="0"/>
-              <a:t>:</a:t>
+              <a:t>current Users/Create screen</a:t>
+            </a:r>
+            <a:r>
+              <a:rPr lang="en-US" dirty="0" smtClean="0"/>
+              <a:t>, type a </a:t>
+            </a:r>
+            <a:r>
+              <a:rPr lang="en-US" b="1" dirty="0" smtClean="0"/>
+              <a:t>user name </a:t>
+            </a:r>
+            <a:r>
+              <a:rPr lang="en-US" dirty="0" smtClean="0"/>
+              <a:t>of your choice and a password you'll remember, like </a:t>
+            </a:r>
+            <a:r>
+              <a:rPr lang="en-US" b="1" dirty="0" smtClean="0"/>
+              <a:t>chef</a:t>
+            </a:r>
+            <a:r>
+              <a:rPr lang="en-US" dirty="0" smtClean="0"/>
+              <a:t>.</a:t>
             </a:r>
           </a:p>
           <a:p>
             <a:endParaRPr lang="en-US" dirty="0" smtClean="0"/>
           </a:p>
           <a:p>
-            <a:pPr marL="457200" indent="-457200">
-              <a:buFont typeface="Wingdings" panose="05000000000000000000" pitchFamily="2" charset="2"/>
-              <a:buChar char="q"/>
-            </a:pPr>
-            <a:r>
-              <a:rPr lang="en-US" b="1" dirty="0"/>
-              <a:t>S</a:t>
-            </a:r>
             <a:r>
               <a:rPr lang="en-US" b="1" dirty="0" smtClean="0"/>
-              <a:t>ite Management </a:t>
-            </a:r>
-            <a:r>
-              <a:rPr lang="en-US" dirty="0" smtClean="0"/>
-              <a:t>users can do everything.</a:t>
-            </a:r>
-          </a:p>
-          <a:p>
-            <a:pPr marL="457200" indent="-457200">
-              <a:buFont typeface="Wingdings" panose="05000000000000000000" pitchFamily="2" charset="2"/>
-              <a:buChar char="q"/>
-            </a:pPr>
+              <a:t>Note</a:t>
+            </a:r>
+            <a:r>
+              <a:rPr lang="en-US" dirty="0" smtClean="0"/>
+              <a:t>: Leave the new user's permissions unchecked for now.</a:t>
+            </a:r>
+          </a:p>
+          <a:p>
+            <a:endParaRPr lang="en-US" dirty="0" smtClean="0"/>
+          </a:p>
+          <a:p>
+            <a:r>
+              <a:rPr lang="en-US" dirty="0" smtClean="0"/>
+              <a:t>5. Click the </a:t>
+            </a:r>
             <a:r>
               <a:rPr lang="en-US" b="1" dirty="0" smtClean="0"/>
-              <a:t>Organization Management </a:t>
-            </a:r>
-            <a:r>
-              <a:rPr lang="en-US" dirty="0" smtClean="0"/>
-              <a:t>users can </a:t>
-            </a:r>
-            <a:r>
-              <a:rPr lang="en-US" dirty="0"/>
-              <a:t>create, edit or delete </a:t>
-            </a:r>
-            <a:r>
-              <a:rPr lang="en-US" dirty="0" smtClean="0"/>
-              <a:t>Organizations.</a:t>
-            </a:r>
-          </a:p>
-          <a:p>
-            <a:pPr marL="457200" indent="-457200">
-              <a:buFont typeface="Wingdings" panose="05000000000000000000" pitchFamily="2" charset="2"/>
-              <a:buChar char="q"/>
-            </a:pPr>
-            <a:r>
-              <a:rPr lang="en-US" b="1" dirty="0" smtClean="0"/>
-              <a:t>User Management </a:t>
-            </a:r>
-            <a:r>
-              <a:rPr lang="en-US" dirty="0" smtClean="0"/>
-              <a:t>users can </a:t>
-            </a:r>
-            <a:r>
-              <a:rPr lang="en-US" dirty="0"/>
-              <a:t>create, edit or delete </a:t>
-            </a:r>
-            <a:r>
-              <a:rPr lang="en-US" dirty="0" smtClean="0"/>
-              <a:t>users.</a:t>
-            </a:r>
-            <a:r>
-              <a:rPr lang="en-US" dirty="0"/>
-              <a:t/>
-            </a:r>
-            <a:br>
-              <a:rPr lang="en-US" dirty="0"/>
-            </a:br>
+              <a:t>Add user</a:t>
+            </a:r>
+            <a:r>
+              <a:rPr lang="en-US" dirty="0" smtClean="0"/>
+              <a:t> button.</a:t>
+            </a:r>
             <a:endParaRPr lang="en-US" dirty="0"/>
           </a:p>
         </p:txBody>
       </p:sp>
       <p:pic>
         <p:nvPicPr>
-          <p:cNvPr id="4" name="Picture 3"/>
+          <p:cNvPr id="8" name="Picture 7"/>
           <p:cNvPicPr>
             <a:picLocks noChangeAspect="1"/>
           </p:cNvPicPr>
           <p:nvPr/>
         </p:nvPicPr>
         <p:blipFill>
-          <a:blip r:embed="rId3"/>
+          <a:blip r:embed="rId2"/>
           <a:stretch>
             <a:fillRect/>
           </a:stretch>
         </p:blipFill>
         <p:spPr>
           <a:xfrm>
-            <a:off x="8396287" y="447472"/>
-            <a:ext cx="7348702" cy="6746350"/>
+            <a:off x="8544060" y="462914"/>
+            <a:ext cx="7000741" cy="7071742"/>
           </a:xfrm>
           <a:prstGeom prst="rect">
             <a:avLst/>
@@ -17366,7 +17412,7 @@
     </p:spTree>
     <p:extLst>
       <p:ext uri="{BB962C8B-B14F-4D97-AF65-F5344CB8AC3E}">
-        <p14:creationId xmlns:p14="http://schemas.microsoft.com/office/powerpoint/2010/main" val="3254653793"/>
+        <p14:creationId xmlns:p14="http://schemas.microsoft.com/office/powerpoint/2010/main" val="3093924348"/>
       </p:ext>
     </p:extLst>
   </p:cSld>
@@ -17684,11 +17730,7 @@
             </a:r>
             <a:r>
               <a:rPr lang="en-US" b="1" dirty="0" smtClean="0"/>
-              <a:t>new user </a:t>
-            </a:r>
-            <a:r>
-              <a:rPr lang="en-US" b="1" dirty="0" smtClean="0"/>
-              <a:t>ID</a:t>
+              <a:t>new user ID</a:t>
             </a:r>
             <a:r>
               <a:rPr lang="en-US" dirty="0" smtClean="0"/>
@@ -19182,15 +19224,49 @@
 </file>
 
 <file path=customXml/item1.xml><?xml version="1.0" encoding="utf-8"?>
-<p:properties xmlns:p="http://schemas.microsoft.com/office/2006/metadata/properties" xmlns:xsi="http://www.w3.org/2001/XMLSchema-instance" xmlns:pc="http://schemas.microsoft.com/office/infopath/2007/PartnerControls">
-  <documentManagement>
-    <_dlc_DocId xmlns="7bb5d761-a2ea-4873-95f7-7a6658fb3ef0">M4CWTKMW727E-592-73</_dlc_DocId>
-    <_dlc_DocIdUrl xmlns="7bb5d761-a2ea-4873-95f7-7a6658fb3ef0">
-      <Url>https://kms.vci.local/marketing/team/_layouts/DocIdRedir.aspx?ID=M4CWTKMW727E-592-73</Url>
-      <Description>M4CWTKMW727E-592-73</Description>
-    </_dlc_DocIdUrl>
-  </documentManagement>
-</p:properties>
+<?mso-contentType ?>
+<spe:Receivers xmlns:spe="http://schemas.microsoft.com/sharepoint/events">
+  <Receiver>
+    <Name>Document ID Generator</Name>
+    <Synchronization>Synchronous</Synchronization>
+    <Type>10001</Type>
+    <SequenceNumber>1000</SequenceNumber>
+    <Assembly>Microsoft.Office.DocumentManagement, Version=14.0.0.0, Culture=neutral, PublicKeyToken=71e9bce111e9429c</Assembly>
+    <Class>Microsoft.Office.DocumentManagement.Internal.DocIdHandler</Class>
+    <Data/>
+    <Filter/>
+  </Receiver>
+  <Receiver>
+    <Name>Document ID Generator</Name>
+    <Synchronization>Synchronous</Synchronization>
+    <Type>10002</Type>
+    <SequenceNumber>1001</SequenceNumber>
+    <Assembly>Microsoft.Office.DocumentManagement, Version=14.0.0.0, Culture=neutral, PublicKeyToken=71e9bce111e9429c</Assembly>
+    <Class>Microsoft.Office.DocumentManagement.Internal.DocIdHandler</Class>
+    <Data/>
+    <Filter/>
+  </Receiver>
+  <Receiver>
+    <Name>Document ID Generator</Name>
+    <Synchronization>Synchronous</Synchronization>
+    <Type>10004</Type>
+    <SequenceNumber>1002</SequenceNumber>
+    <Assembly>Microsoft.Office.DocumentManagement, Version=14.0.0.0, Culture=neutral, PublicKeyToken=71e9bce111e9429c</Assembly>
+    <Class>Microsoft.Office.DocumentManagement.Internal.DocIdHandler</Class>
+    <Data/>
+    <Filter/>
+  </Receiver>
+  <Receiver>
+    <Name>Document ID Generator</Name>
+    <Synchronization>Synchronous</Synchronization>
+    <Type>10006</Type>
+    <SequenceNumber>1003</SequenceNumber>
+    <Assembly>Microsoft.Office.DocumentManagement, Version=14.0.0.0, Culture=neutral, PublicKeyToken=71e9bce111e9429c</Assembly>
+    <Class>Microsoft.Office.DocumentManagement.Internal.DocIdHandler</Class>
+    <Data/>
+    <Filter/>
+  </Receiver>
+</spe:Receivers>
 </file>
 
 <file path=customXml/item2.xml><?xml version="1.0" encoding="utf-8"?>
@@ -19339,49 +19415,15 @@
 </file>
 
 <file path=customXml/item3.xml><?xml version="1.0" encoding="utf-8"?>
-<?mso-contentType ?>
-<spe:Receivers xmlns:spe="http://schemas.microsoft.com/sharepoint/events">
-  <Receiver>
-    <Name>Document ID Generator</Name>
-    <Synchronization>Synchronous</Synchronization>
-    <Type>10001</Type>
-    <SequenceNumber>1000</SequenceNumber>
-    <Assembly>Microsoft.Office.DocumentManagement, Version=14.0.0.0, Culture=neutral, PublicKeyToken=71e9bce111e9429c</Assembly>
-    <Class>Microsoft.Office.DocumentManagement.Internal.DocIdHandler</Class>
-    <Data/>
-    <Filter/>
-  </Receiver>
-  <Receiver>
-    <Name>Document ID Generator</Name>
-    <Synchronization>Synchronous</Synchronization>
-    <Type>10002</Type>
-    <SequenceNumber>1001</SequenceNumber>
-    <Assembly>Microsoft.Office.DocumentManagement, Version=14.0.0.0, Culture=neutral, PublicKeyToken=71e9bce111e9429c</Assembly>
-    <Class>Microsoft.Office.DocumentManagement.Internal.DocIdHandler</Class>
-    <Data/>
-    <Filter/>
-  </Receiver>
-  <Receiver>
-    <Name>Document ID Generator</Name>
-    <Synchronization>Synchronous</Synchronization>
-    <Type>10004</Type>
-    <SequenceNumber>1002</SequenceNumber>
-    <Assembly>Microsoft.Office.DocumentManagement, Version=14.0.0.0, Culture=neutral, PublicKeyToken=71e9bce111e9429c</Assembly>
-    <Class>Microsoft.Office.DocumentManagement.Internal.DocIdHandler</Class>
-    <Data/>
-    <Filter/>
-  </Receiver>
-  <Receiver>
-    <Name>Document ID Generator</Name>
-    <Synchronization>Synchronous</Synchronization>
-    <Type>10006</Type>
-    <SequenceNumber>1003</SequenceNumber>
-    <Assembly>Microsoft.Office.DocumentManagement, Version=14.0.0.0, Culture=neutral, PublicKeyToken=71e9bce111e9429c</Assembly>
-    <Class>Microsoft.Office.DocumentManagement.Internal.DocIdHandler</Class>
-    <Data/>
-    <Filter/>
-  </Receiver>
-</spe:Receivers>
+<p:properties xmlns:p="http://schemas.microsoft.com/office/2006/metadata/properties" xmlns:xsi="http://www.w3.org/2001/XMLSchema-instance" xmlns:pc="http://schemas.microsoft.com/office/infopath/2007/PartnerControls">
+  <documentManagement>
+    <_dlc_DocId xmlns="7bb5d761-a2ea-4873-95f7-7a6658fb3ef0">M4CWTKMW727E-592-73</_dlc_DocId>
+    <_dlc_DocIdUrl xmlns="7bb5d761-a2ea-4873-95f7-7a6658fb3ef0">
+      <Url>https://kms.vci.local/marketing/team/_layouts/DocIdRedir.aspx?ID=M4CWTKMW727E-592-73</Url>
+      <Description>M4CWTKMW727E-592-73</Description>
+    </_dlc_DocIdUrl>
+  </documentManagement>
+</p:properties>
 </file>
 
 <file path=customXml/item4.xml><?xml version="1.0" encoding="utf-8"?>
@@ -19394,17 +19436,9 @@
 </file>
 
 <file path=customXml/itemProps1.xml><?xml version="1.0" encoding="utf-8"?>
-<ds:datastoreItem xmlns:ds="http://schemas.openxmlformats.org/officeDocument/2006/customXml" ds:itemID="{6921749B-AEB7-461B-845F-603CABD25259}">
+<ds:datastoreItem xmlns:ds="http://schemas.openxmlformats.org/officeDocument/2006/customXml" ds:itemID="{B13EBC30-FE27-4C6A-B723-23FC2188F7DC}">
   <ds:schemaRefs>
-    <ds:schemaRef ds:uri="http://schemas.microsoft.com/office/2006/documentManagement/types"/>
-    <ds:schemaRef ds:uri="http://schemas.microsoft.com/office/infopath/2007/PartnerControls"/>
-    <ds:schemaRef ds:uri="http://purl.org/dc/elements/1.1/"/>
-    <ds:schemaRef ds:uri="http://schemas.microsoft.com/office/2006/metadata/properties"/>
-    <ds:schemaRef ds:uri="7bb5d761-a2ea-4873-95f7-7a6658fb3ef0"/>
-    <ds:schemaRef ds:uri="http://purl.org/dc/terms/"/>
-    <ds:schemaRef ds:uri="http://schemas.openxmlformats.org/package/2006/metadata/core-properties"/>
-    <ds:schemaRef ds:uri="http://www.w3.org/XML/1998/namespace"/>
-    <ds:schemaRef ds:uri="http://purl.org/dc/dcmitype/"/>
+    <ds:schemaRef ds:uri="http://schemas.microsoft.com/sharepoint/events"/>
   </ds:schemaRefs>
 </ds:datastoreItem>
 </file>
@@ -19428,9 +19462,17 @@
 </file>
 
 <file path=customXml/itemProps3.xml><?xml version="1.0" encoding="utf-8"?>
-<ds:datastoreItem xmlns:ds="http://schemas.openxmlformats.org/officeDocument/2006/customXml" ds:itemID="{B13EBC30-FE27-4C6A-B723-23FC2188F7DC}">
+<ds:datastoreItem xmlns:ds="http://schemas.openxmlformats.org/officeDocument/2006/customXml" ds:itemID="{6921749B-AEB7-461B-845F-603CABD25259}">
   <ds:schemaRefs>
-    <ds:schemaRef ds:uri="http://schemas.microsoft.com/sharepoint/events"/>
+    <ds:schemaRef ds:uri="http://schemas.microsoft.com/office/2006/documentManagement/types"/>
+    <ds:schemaRef ds:uri="http://schemas.microsoft.com/office/infopath/2007/PartnerControls"/>
+    <ds:schemaRef ds:uri="http://purl.org/dc/elements/1.1/"/>
+    <ds:schemaRef ds:uri="http://schemas.microsoft.com/office/2006/metadata/properties"/>
+    <ds:schemaRef ds:uri="7bb5d761-a2ea-4873-95f7-7a6658fb3ef0"/>
+    <ds:schemaRef ds:uri="http://purl.org/dc/terms/"/>
+    <ds:schemaRef ds:uri="http://schemas.openxmlformats.org/package/2006/metadata/core-properties"/>
+    <ds:schemaRef ds:uri="http://www.w3.org/XML/1998/namespace"/>
+    <ds:schemaRef ds:uri="http://purl.org/dc/dcmitype/"/>
   </ds:schemaRefs>
 </ds:datastoreItem>
 </file>

</xml_diff>